<commit_message>
linear regression updates, residual image file
</commit_message>
<xml_diff>
--- a/slides/08_linear_regression.pptx
+++ b/slides/08_linear_regression.pptx
@@ -4043,7 +4043,7 @@
           <a:p>
             <a:fld id="{79A72009-0C07-A442-B1C4-26ED420CFE6B}" type="datetimeFigureOut">
               <a:rPr lang="en-US" smtClean="0"/>
-              <a:t>9/23/18</a:t>
+              <a:t>9/24/18</a:t>
             </a:fld>
             <a:endParaRPr lang="en-US"/>
           </a:p>
@@ -4209,7 +4209,7 @@
             <a:fld id="{9608008F-8C0F-4F63-86DC-E7B67385E4BD}" type="datetimeFigureOut">
               <a:rPr lang="en-US" smtClean="0"/>
               <a:pPr/>
-              <a:t>9/23/18</a:t>
+              <a:t>9/24/18</a:t>
             </a:fld>
             <a:endParaRPr lang="en-US"/>
           </a:p>
@@ -6898,7 +6898,7 @@
                 </a:solidFill>
               </a:rPr>
               <a:pPr/>
-              <a:t>9/23/18</a:t>
+              <a:t>9/24/18</a:t>
             </a:fld>
             <a:endParaRPr lang="en-US">
               <a:solidFill>
@@ -7128,7 +7128,7 @@
                 </a:solidFill>
               </a:rPr>
               <a:pPr/>
-              <a:t>9/23/18</a:t>
+              <a:t>9/24/18</a:t>
             </a:fld>
             <a:endParaRPr lang="en-US">
               <a:solidFill>
@@ -7338,7 +7338,7 @@
                 </a:solidFill>
               </a:rPr>
               <a:pPr/>
-              <a:t>9/23/18</a:t>
+              <a:t>9/24/18</a:t>
             </a:fld>
             <a:endParaRPr lang="en-US">
               <a:solidFill>
@@ -7640,7 +7640,7 @@
                 </a:solidFill>
               </a:rPr>
               <a:pPr/>
-              <a:t>9/23/18</a:t>
+              <a:t>9/24/18</a:t>
             </a:fld>
             <a:endParaRPr lang="en-US">
               <a:solidFill>
@@ -7947,7 +7947,7 @@
                 </a:solidFill>
               </a:rPr>
               <a:pPr/>
-              <a:t>9/23/18</a:t>
+              <a:t>9/24/18</a:t>
             </a:fld>
             <a:endParaRPr lang="en-US">
               <a:solidFill>
@@ -8264,7 +8264,7 @@
                 </a:solidFill>
               </a:rPr>
               <a:pPr/>
-              <a:t>9/23/18</a:t>
+              <a:t>9/24/18</a:t>
             </a:fld>
             <a:endParaRPr lang="en-US">
               <a:solidFill>
@@ -8715,7 +8715,7 @@
                 </a:solidFill>
               </a:rPr>
               <a:pPr/>
-              <a:t>9/23/18</a:t>
+              <a:t>9/24/18</a:t>
             </a:fld>
             <a:endParaRPr lang="en-US">
               <a:solidFill>
@@ -8864,7 +8864,7 @@
                 </a:solidFill>
               </a:rPr>
               <a:pPr/>
-              <a:t>9/23/18</a:t>
+              <a:t>9/24/18</a:t>
             </a:fld>
             <a:endParaRPr lang="en-US">
               <a:solidFill>
@@ -8991,7 +8991,7 @@
                 </a:solidFill>
               </a:rPr>
               <a:pPr/>
-              <a:t>9/23/18</a:t>
+              <a:t>9/24/18</a:t>
             </a:fld>
             <a:endParaRPr lang="en-US">
               <a:solidFill>
@@ -9191,7 +9191,7 @@
                 </a:solidFill>
               </a:rPr>
               <a:pPr/>
-              <a:t>9/23/18</a:t>
+              <a:t>9/24/18</a:t>
             </a:fld>
             <a:endParaRPr lang="en-US">
               <a:solidFill>
@@ -9498,7 +9498,7 @@
                 </a:solidFill>
               </a:rPr>
               <a:pPr/>
-              <a:t>9/23/18</a:t>
+              <a:t>9/24/18</a:t>
             </a:fld>
             <a:endParaRPr lang="en-US">
               <a:solidFill>
@@ -9782,7 +9782,7 @@
                 </a:solidFill>
               </a:rPr>
               <a:pPr/>
-              <a:t>9/23/18</a:t>
+              <a:t>9/24/18</a:t>
             </a:fld>
             <a:endParaRPr lang="en-US">
               <a:solidFill>
@@ -9982,7 +9982,7 @@
                 </a:solidFill>
               </a:rPr>
               <a:pPr/>
-              <a:t>9/23/18</a:t>
+              <a:t>9/24/18</a:t>
             </a:fld>
             <a:endParaRPr lang="en-US">
               <a:solidFill>
@@ -10192,7 +10192,7 @@
                 </a:solidFill>
               </a:rPr>
               <a:pPr/>
-              <a:t>9/23/18</a:t>
+              <a:t>9/24/18</a:t>
             </a:fld>
             <a:endParaRPr lang="en-US">
               <a:solidFill>
@@ -10470,7 +10470,7 @@
                 </a:solidFill>
               </a:rPr>
               <a:pPr/>
-              <a:t>9/23/18</a:t>
+              <a:t>9/24/18</a:t>
             </a:fld>
             <a:endParaRPr lang="en-US">
               <a:solidFill>
@@ -10783,7 +10783,7 @@
                 </a:solidFill>
               </a:rPr>
               <a:pPr/>
-              <a:t>9/23/18</a:t>
+              <a:t>9/24/18</a:t>
             </a:fld>
             <a:endParaRPr lang="en-US">
               <a:solidFill>
@@ -11114,7 +11114,7 @@
                 </a:solidFill>
               </a:rPr>
               <a:pPr/>
-              <a:t>9/23/18</a:t>
+              <a:t>9/24/18</a:t>
             </a:fld>
             <a:endParaRPr lang="en-US">
               <a:solidFill>
@@ -11585,7 +11585,7 @@
                 </a:solidFill>
               </a:rPr>
               <a:pPr/>
-              <a:t>9/23/18</a:t>
+              <a:t>9/24/18</a:t>
             </a:fld>
             <a:endParaRPr lang="en-US">
               <a:solidFill>
@@ -11742,7 +11742,7 @@
                 </a:solidFill>
               </a:rPr>
               <a:pPr/>
-              <a:t>9/23/18</a:t>
+              <a:t>9/24/18</a:t>
             </a:fld>
             <a:endParaRPr lang="en-US">
               <a:solidFill>
@@ -12019,7 +12019,7 @@
                 </a:solidFill>
               </a:rPr>
               <a:pPr/>
-              <a:t>9/23/18</a:t>
+              <a:t>9/24/18</a:t>
             </a:fld>
             <a:endParaRPr lang="en-US">
               <a:solidFill>
@@ -12146,7 +12146,7 @@
                 </a:solidFill>
               </a:rPr>
               <a:pPr/>
-              <a:t>9/23/18</a:t>
+              <a:t>9/24/18</a:t>
             </a:fld>
             <a:endParaRPr lang="en-US">
               <a:solidFill>
@@ -12462,7 +12462,7 @@
                 </a:solidFill>
               </a:rPr>
               <a:pPr/>
-              <a:t>9/23/18</a:t>
+              <a:t>9/24/18</a:t>
             </a:fld>
             <a:endParaRPr lang="en-US">
               <a:solidFill>
@@ -12755,7 +12755,7 @@
                 </a:solidFill>
               </a:rPr>
               <a:pPr/>
-              <a:t>9/23/18</a:t>
+              <a:t>9/24/18</a:t>
             </a:fld>
             <a:endParaRPr lang="en-US">
               <a:solidFill>
@@ -12971,7 +12971,7 @@
                 </a:solidFill>
               </a:rPr>
               <a:pPr/>
-              <a:t>9/23/18</a:t>
+              <a:t>9/24/18</a:t>
             </a:fld>
             <a:endParaRPr lang="en-US">
               <a:solidFill>
@@ -13187,7 +13187,7 @@
                 </a:solidFill>
               </a:rPr>
               <a:pPr/>
-              <a:t>9/23/18</a:t>
+              <a:t>9/24/18</a:t>
             </a:fld>
             <a:endParaRPr lang="en-US">
               <a:solidFill>
@@ -13403,7 +13403,7 @@
                 </a:solidFill>
               </a:rPr>
               <a:pPr/>
-              <a:t>9/23/18</a:t>
+              <a:t>9/24/18</a:t>
             </a:fld>
             <a:endParaRPr lang="en-US">
               <a:solidFill>
@@ -13720,7 +13720,7 @@
                 </a:solidFill>
               </a:rPr>
               <a:pPr/>
-              <a:t>9/23/18</a:t>
+              <a:t>9/24/18</a:t>
             </a:fld>
             <a:endParaRPr lang="en-US">
               <a:solidFill>
@@ -14171,7 +14171,7 @@
                 </a:solidFill>
               </a:rPr>
               <a:pPr/>
-              <a:t>9/23/18</a:t>
+              <a:t>9/24/18</a:t>
             </a:fld>
             <a:endParaRPr lang="en-US">
               <a:solidFill>
@@ -14320,7 +14320,7 @@
                 </a:solidFill>
               </a:rPr>
               <a:pPr/>
-              <a:t>9/23/18</a:t>
+              <a:t>9/24/18</a:t>
             </a:fld>
             <a:endParaRPr lang="en-US">
               <a:solidFill>
@@ -14447,7 +14447,7 @@
                 </a:solidFill>
               </a:rPr>
               <a:pPr/>
-              <a:t>9/23/18</a:t>
+              <a:t>9/24/18</a:t>
             </a:fld>
             <a:endParaRPr lang="en-US">
               <a:solidFill>
@@ -14754,7 +14754,7 @@
                 </a:solidFill>
               </a:rPr>
               <a:pPr/>
-              <a:t>9/23/18</a:t>
+              <a:t>9/24/18</a:t>
             </a:fld>
             <a:endParaRPr lang="en-US">
               <a:solidFill>
@@ -15041,7 +15041,7 @@
                 </a:solidFill>
               </a:rPr>
               <a:pPr/>
-              <a:t>9/23/18</a:t>
+              <a:t>9/24/18</a:t>
             </a:fld>
             <a:endParaRPr lang="en-US">
               <a:solidFill>
@@ -15284,7 +15284,7 @@
                 </a:solidFill>
               </a:rPr>
               <a:pPr/>
-              <a:t>9/23/18</a:t>
+              <a:t>9/24/18</a:t>
             </a:fld>
             <a:endParaRPr lang="en-US">
               <a:solidFill>
@@ -15825,7 +15825,7 @@
                 </a:solidFill>
               </a:rPr>
               <a:pPr/>
-              <a:t>9/23/18</a:t>
+              <a:t>9/24/18</a:t>
             </a:fld>
             <a:endParaRPr lang="en-US">
               <a:solidFill>
@@ -16009,7 +16009,7 @@
           <a:noFill/>
           <a:extLst>
             <a:ext uri="{909E8E84-426E-40dd-AFC4-6F175D3DCCD1}">
-              <a14:hiddenFill xmlns="" xmlns:a14="http://schemas.microsoft.com/office/drawing/2010/main">
+              <a14:hiddenFill xmlns:a14="http://schemas.microsoft.com/office/drawing/2010/main" xmlns="">
                 <a:solidFill>
                   <a:srgbClr val="FFFFFF"/>
                 </a:solidFill>
@@ -16050,7 +16050,7 @@
           <a:noFill/>
           <a:extLst>
             <a:ext uri="{909E8E84-426E-40dd-AFC4-6F175D3DCCD1}">
-              <a14:hiddenFill xmlns="" xmlns:a14="http://schemas.microsoft.com/office/drawing/2010/main">
+              <a14:hiddenFill xmlns:a14="http://schemas.microsoft.com/office/drawing/2010/main" xmlns="">
                 <a:solidFill>
                   <a:srgbClr val="FFFFFF"/>
                 </a:solidFill>
@@ -16091,7 +16091,7 @@
           <a:noFill/>
           <a:extLst>
             <a:ext uri="{909E8E84-426E-40dd-AFC4-6F175D3DCCD1}">
-              <a14:hiddenFill xmlns="" xmlns:a14="http://schemas.microsoft.com/office/drawing/2010/main">
+              <a14:hiddenFill xmlns:a14="http://schemas.microsoft.com/office/drawing/2010/main" xmlns="">
                 <a:solidFill>
                   <a:srgbClr val="FFFFFF"/>
                 </a:solidFill>
@@ -16132,7 +16132,7 @@
           <a:noFill/>
           <a:extLst>
             <a:ext uri="{909E8E84-426E-40dd-AFC4-6F175D3DCCD1}">
-              <a14:hiddenFill xmlns="" xmlns:a14="http://schemas.microsoft.com/office/drawing/2010/main">
+              <a14:hiddenFill xmlns:a14="http://schemas.microsoft.com/office/drawing/2010/main" xmlns="">
                 <a:solidFill>
                   <a:srgbClr val="FFFFFF"/>
                 </a:solidFill>
@@ -16479,7 +16479,7 @@
                 </a:solidFill>
               </a:rPr>
               <a:pPr/>
-              <a:t>9/23/18</a:t>
+              <a:t>9/24/18</a:t>
             </a:fld>
             <a:endParaRPr lang="en-US">
               <a:solidFill>
@@ -16726,7 +16726,7 @@
           <a:noFill/>
           <a:extLst>
             <a:ext uri="{909E8E84-426E-40dd-AFC4-6F175D3DCCD1}">
-              <a14:hiddenFill xmlns="" xmlns:a14="http://schemas.microsoft.com/office/drawing/2010/main">
+              <a14:hiddenFill xmlns:a14="http://schemas.microsoft.com/office/drawing/2010/main" xmlns="">
                 <a:solidFill>
                   <a:srgbClr val="FFFFFF"/>
                 </a:solidFill>
@@ -16767,7 +16767,7 @@
           <a:noFill/>
           <a:extLst>
             <a:ext uri="{909E8E84-426E-40dd-AFC4-6F175D3DCCD1}">
-              <a14:hiddenFill xmlns="" xmlns:a14="http://schemas.microsoft.com/office/drawing/2010/main">
+              <a14:hiddenFill xmlns:a14="http://schemas.microsoft.com/office/drawing/2010/main" xmlns="">
                 <a:solidFill>
                   <a:srgbClr val="FFFFFF"/>
                 </a:solidFill>
@@ -16808,7 +16808,7 @@
           <a:noFill/>
           <a:extLst>
             <a:ext uri="{909E8E84-426E-40dd-AFC4-6F175D3DCCD1}">
-              <a14:hiddenFill xmlns="" xmlns:a14="http://schemas.microsoft.com/office/drawing/2010/main">
+              <a14:hiddenFill xmlns:a14="http://schemas.microsoft.com/office/drawing/2010/main" xmlns="">
                 <a:solidFill>
                   <a:srgbClr val="FFFFFF"/>
                 </a:solidFill>
@@ -16849,7 +16849,7 @@
           <a:noFill/>
           <a:extLst>
             <a:ext uri="{909E8E84-426E-40dd-AFC4-6F175D3DCCD1}">
-              <a14:hiddenFill xmlns="" xmlns:a14="http://schemas.microsoft.com/office/drawing/2010/main">
+              <a14:hiddenFill xmlns:a14="http://schemas.microsoft.com/office/drawing/2010/main" xmlns="">
                 <a:solidFill>
                   <a:srgbClr val="FFFFFF"/>
                 </a:solidFill>
@@ -18415,7 +18415,7 @@
           <a:noFill/>
           <a:extLst>
             <a:ext uri="{909E8E84-426E-40dd-AFC4-6F175D3DCCD1}">
-              <a14:hiddenFill xmlns="" xmlns:a14="http://schemas.microsoft.com/office/drawing/2010/main">
+              <a14:hiddenFill xmlns:a14="http://schemas.microsoft.com/office/drawing/2010/main" xmlns="">
                 <a:solidFill>
                   <a:srgbClr val="FFFFFF"/>
                 </a:solidFill>
@@ -27228,7 +27228,7 @@
           <a:noFill/>
           <a:extLst>
             <a:ext uri="{909E8E84-426E-40dd-AFC4-6F175D3DCCD1}">
-              <a14:hiddenFill xmlns="" xmlns:a14="http://schemas.microsoft.com/office/drawing/2010/main">
+              <a14:hiddenFill xmlns:a14="http://schemas.microsoft.com/office/drawing/2010/main" xmlns="">
                 <a:solidFill>
                   <a:srgbClr val="FFFFFF"/>
                 </a:solidFill>
@@ -34136,7 +34136,7 @@
         </p:blipFill>
         <p:spPr>
           <a:xfrm>
-            <a:off x="1323352" y="3793711"/>
+            <a:off x="1323352" y="3830834"/>
             <a:ext cx="6576822" cy="306705"/>
           </a:xfrm>
           <a:prstGeom prst="rect">

</xml_diff>

<commit_message>
update to linear regression notebook and slides
</commit_message>
<xml_diff>
--- a/slides/08_linear_regression.pptx
+++ b/slides/08_linear_regression.pptx
@@ -7,10 +7,10 @@
     <p:sldMasterId id="2147483722" r:id="rId3"/>
   </p:sldMasterIdLst>
   <p:notesMasterIdLst>
-    <p:notesMasterId r:id="rId56"/>
+    <p:notesMasterId r:id="rId58"/>
   </p:notesMasterIdLst>
   <p:handoutMasterIdLst>
-    <p:handoutMasterId r:id="rId57"/>
+    <p:handoutMasterId r:id="rId59"/>
   </p:handoutMasterIdLst>
   <p:sldIdLst>
     <p:sldId id="563" r:id="rId4"/>
@@ -51,25 +51,27 @@
     <p:sldId id="653" r:id="rId39"/>
     <p:sldId id="654" r:id="rId40"/>
     <p:sldId id="655" r:id="rId41"/>
-    <p:sldId id="659" r:id="rId42"/>
-    <p:sldId id="661" r:id="rId43"/>
-    <p:sldId id="679" r:id="rId44"/>
-    <p:sldId id="663" r:id="rId45"/>
-    <p:sldId id="664" r:id="rId46"/>
-    <p:sldId id="668" r:id="rId47"/>
-    <p:sldId id="670" r:id="rId48"/>
-    <p:sldId id="671" r:id="rId49"/>
-    <p:sldId id="672" r:id="rId50"/>
-    <p:sldId id="677" r:id="rId51"/>
-    <p:sldId id="678" r:id="rId52"/>
-    <p:sldId id="673" r:id="rId53"/>
-    <p:sldId id="669" r:id="rId54"/>
-    <p:sldId id="680" r:id="rId55"/>
+    <p:sldId id="681" r:id="rId42"/>
+    <p:sldId id="682" r:id="rId43"/>
+    <p:sldId id="659" r:id="rId44"/>
+    <p:sldId id="661" r:id="rId45"/>
+    <p:sldId id="663" r:id="rId46"/>
+    <p:sldId id="679" r:id="rId47"/>
+    <p:sldId id="664" r:id="rId48"/>
+    <p:sldId id="668" r:id="rId49"/>
+    <p:sldId id="670" r:id="rId50"/>
+    <p:sldId id="671" r:id="rId51"/>
+    <p:sldId id="672" r:id="rId52"/>
+    <p:sldId id="677" r:id="rId53"/>
+    <p:sldId id="678" r:id="rId54"/>
+    <p:sldId id="673" r:id="rId55"/>
+    <p:sldId id="669" r:id="rId56"/>
+    <p:sldId id="680" r:id="rId57"/>
   </p:sldIdLst>
   <p:sldSz cx="9144000" cy="5143500" type="screen16x9"/>
   <p:notesSz cx="6858000" cy="9144000"/>
   <p:custDataLst>
-    <p:tags r:id="rId58"/>
+    <p:tags r:id="rId60"/>
   </p:custDataLst>
   <p:defaultTextStyle>
     <a:defPPr>
@@ -4043,7 +4045,7 @@
           <a:p>
             <a:fld id="{79A72009-0C07-A442-B1C4-26ED420CFE6B}" type="datetimeFigureOut">
               <a:rPr lang="en-US" smtClean="0"/>
-              <a:t>9/24/18</a:t>
+              <a:t>9/27/18</a:t>
             </a:fld>
             <a:endParaRPr lang="en-US"/>
           </a:p>
@@ -4209,7 +4211,7 @@
             <a:fld id="{9608008F-8C0F-4F63-86DC-E7B67385E4BD}" type="datetimeFigureOut">
               <a:rPr lang="en-US" smtClean="0"/>
               <a:pPr/>
-              <a:t>9/24/18</a:t>
+              <a:t>9/27/18</a:t>
             </a:fld>
             <a:endParaRPr lang="en-US"/>
           </a:p>
@@ -5679,7 +5681,7 @@
             <a:fld id="{8FF38DAD-5F37-4EA5-A798-26ED1E453939}" type="slidenum">
               <a:rPr lang="en-US" smtClean="0"/>
               <a:pPr/>
-              <a:t>39</a:t>
+              <a:t>41</a:t>
             </a:fld>
             <a:endParaRPr lang="en-US"/>
           </a:p>
@@ -5767,7 +5769,7 @@
             <a:fld id="{8FF38DAD-5F37-4EA5-A798-26ED1E453939}" type="slidenum">
               <a:rPr lang="en-US" smtClean="0"/>
               <a:pPr/>
-              <a:t>40</a:t>
+              <a:t>42</a:t>
             </a:fld>
             <a:endParaRPr lang="en-US"/>
           </a:p>
@@ -5852,7 +5854,7 @@
             <a:fld id="{8FF38DAD-5F37-4EA5-A798-26ED1E453939}" type="slidenum">
               <a:rPr lang="en-US" smtClean="0"/>
               <a:pPr/>
-              <a:t>42</a:t>
+              <a:t>43</a:t>
             </a:fld>
             <a:endParaRPr lang="en-US"/>
           </a:p>
@@ -5937,7 +5939,7 @@
             <a:fld id="{8FF38DAD-5F37-4EA5-A798-26ED1E453939}" type="slidenum">
               <a:rPr lang="en-US" smtClean="0"/>
               <a:pPr/>
-              <a:t>43</a:t>
+              <a:t>45</a:t>
             </a:fld>
             <a:endParaRPr lang="en-US"/>
           </a:p>
@@ -6022,7 +6024,7 @@
             <a:fld id="{8FF38DAD-5F37-4EA5-A798-26ED1E453939}" type="slidenum">
               <a:rPr lang="en-US" smtClean="0"/>
               <a:pPr/>
-              <a:t>44</a:t>
+              <a:t>46</a:t>
             </a:fld>
             <a:endParaRPr lang="en-US"/>
           </a:p>
@@ -6898,7 +6900,7 @@
                 </a:solidFill>
               </a:rPr>
               <a:pPr/>
-              <a:t>9/24/18</a:t>
+              <a:t>9/27/18</a:t>
             </a:fld>
             <a:endParaRPr lang="en-US">
               <a:solidFill>
@@ -7128,7 +7130,7 @@
                 </a:solidFill>
               </a:rPr>
               <a:pPr/>
-              <a:t>9/24/18</a:t>
+              <a:t>9/27/18</a:t>
             </a:fld>
             <a:endParaRPr lang="en-US">
               <a:solidFill>
@@ -7338,7 +7340,7 @@
                 </a:solidFill>
               </a:rPr>
               <a:pPr/>
-              <a:t>9/24/18</a:t>
+              <a:t>9/27/18</a:t>
             </a:fld>
             <a:endParaRPr lang="en-US">
               <a:solidFill>
@@ -7640,7 +7642,7 @@
                 </a:solidFill>
               </a:rPr>
               <a:pPr/>
-              <a:t>9/24/18</a:t>
+              <a:t>9/27/18</a:t>
             </a:fld>
             <a:endParaRPr lang="en-US">
               <a:solidFill>
@@ -7947,7 +7949,7 @@
                 </a:solidFill>
               </a:rPr>
               <a:pPr/>
-              <a:t>9/24/18</a:t>
+              <a:t>9/27/18</a:t>
             </a:fld>
             <a:endParaRPr lang="en-US">
               <a:solidFill>
@@ -8264,7 +8266,7 @@
                 </a:solidFill>
               </a:rPr>
               <a:pPr/>
-              <a:t>9/24/18</a:t>
+              <a:t>9/27/18</a:t>
             </a:fld>
             <a:endParaRPr lang="en-US">
               <a:solidFill>
@@ -8715,7 +8717,7 @@
                 </a:solidFill>
               </a:rPr>
               <a:pPr/>
-              <a:t>9/24/18</a:t>
+              <a:t>9/27/18</a:t>
             </a:fld>
             <a:endParaRPr lang="en-US">
               <a:solidFill>
@@ -8864,7 +8866,7 @@
                 </a:solidFill>
               </a:rPr>
               <a:pPr/>
-              <a:t>9/24/18</a:t>
+              <a:t>9/27/18</a:t>
             </a:fld>
             <a:endParaRPr lang="en-US">
               <a:solidFill>
@@ -8991,7 +8993,7 @@
                 </a:solidFill>
               </a:rPr>
               <a:pPr/>
-              <a:t>9/24/18</a:t>
+              <a:t>9/27/18</a:t>
             </a:fld>
             <a:endParaRPr lang="en-US">
               <a:solidFill>
@@ -9191,7 +9193,7 @@
                 </a:solidFill>
               </a:rPr>
               <a:pPr/>
-              <a:t>9/24/18</a:t>
+              <a:t>9/27/18</a:t>
             </a:fld>
             <a:endParaRPr lang="en-US">
               <a:solidFill>
@@ -9498,7 +9500,7 @@
                 </a:solidFill>
               </a:rPr>
               <a:pPr/>
-              <a:t>9/24/18</a:t>
+              <a:t>9/27/18</a:t>
             </a:fld>
             <a:endParaRPr lang="en-US">
               <a:solidFill>
@@ -9782,7 +9784,7 @@
                 </a:solidFill>
               </a:rPr>
               <a:pPr/>
-              <a:t>9/24/18</a:t>
+              <a:t>9/27/18</a:t>
             </a:fld>
             <a:endParaRPr lang="en-US">
               <a:solidFill>
@@ -9982,7 +9984,7 @@
                 </a:solidFill>
               </a:rPr>
               <a:pPr/>
-              <a:t>9/24/18</a:t>
+              <a:t>9/27/18</a:t>
             </a:fld>
             <a:endParaRPr lang="en-US">
               <a:solidFill>
@@ -10192,7 +10194,7 @@
                 </a:solidFill>
               </a:rPr>
               <a:pPr/>
-              <a:t>9/24/18</a:t>
+              <a:t>9/27/18</a:t>
             </a:fld>
             <a:endParaRPr lang="en-US">
               <a:solidFill>
@@ -10470,7 +10472,7 @@
                 </a:solidFill>
               </a:rPr>
               <a:pPr/>
-              <a:t>9/24/18</a:t>
+              <a:t>9/27/18</a:t>
             </a:fld>
             <a:endParaRPr lang="en-US">
               <a:solidFill>
@@ -10783,7 +10785,7 @@
                 </a:solidFill>
               </a:rPr>
               <a:pPr/>
-              <a:t>9/24/18</a:t>
+              <a:t>9/27/18</a:t>
             </a:fld>
             <a:endParaRPr lang="en-US">
               <a:solidFill>
@@ -11114,7 +11116,7 @@
                 </a:solidFill>
               </a:rPr>
               <a:pPr/>
-              <a:t>9/24/18</a:t>
+              <a:t>9/27/18</a:t>
             </a:fld>
             <a:endParaRPr lang="en-US">
               <a:solidFill>
@@ -11585,7 +11587,7 @@
                 </a:solidFill>
               </a:rPr>
               <a:pPr/>
-              <a:t>9/24/18</a:t>
+              <a:t>9/27/18</a:t>
             </a:fld>
             <a:endParaRPr lang="en-US">
               <a:solidFill>
@@ -11742,7 +11744,7 @@
                 </a:solidFill>
               </a:rPr>
               <a:pPr/>
-              <a:t>9/24/18</a:t>
+              <a:t>9/27/18</a:t>
             </a:fld>
             <a:endParaRPr lang="en-US">
               <a:solidFill>
@@ -12019,7 +12021,7 @@
                 </a:solidFill>
               </a:rPr>
               <a:pPr/>
-              <a:t>9/24/18</a:t>
+              <a:t>9/27/18</a:t>
             </a:fld>
             <a:endParaRPr lang="en-US">
               <a:solidFill>
@@ -12146,7 +12148,7 @@
                 </a:solidFill>
               </a:rPr>
               <a:pPr/>
-              <a:t>9/24/18</a:t>
+              <a:t>9/27/18</a:t>
             </a:fld>
             <a:endParaRPr lang="en-US">
               <a:solidFill>
@@ -12462,7 +12464,7 @@
                 </a:solidFill>
               </a:rPr>
               <a:pPr/>
-              <a:t>9/24/18</a:t>
+              <a:t>9/27/18</a:t>
             </a:fld>
             <a:endParaRPr lang="en-US">
               <a:solidFill>
@@ -12755,7 +12757,7 @@
                 </a:solidFill>
               </a:rPr>
               <a:pPr/>
-              <a:t>9/24/18</a:t>
+              <a:t>9/27/18</a:t>
             </a:fld>
             <a:endParaRPr lang="en-US">
               <a:solidFill>
@@ -12971,7 +12973,7 @@
                 </a:solidFill>
               </a:rPr>
               <a:pPr/>
-              <a:t>9/24/18</a:t>
+              <a:t>9/27/18</a:t>
             </a:fld>
             <a:endParaRPr lang="en-US">
               <a:solidFill>
@@ -13187,7 +13189,7 @@
                 </a:solidFill>
               </a:rPr>
               <a:pPr/>
-              <a:t>9/24/18</a:t>
+              <a:t>9/27/18</a:t>
             </a:fld>
             <a:endParaRPr lang="en-US">
               <a:solidFill>
@@ -13403,7 +13405,7 @@
                 </a:solidFill>
               </a:rPr>
               <a:pPr/>
-              <a:t>9/24/18</a:t>
+              <a:t>9/27/18</a:t>
             </a:fld>
             <a:endParaRPr lang="en-US">
               <a:solidFill>
@@ -13720,7 +13722,7 @@
                 </a:solidFill>
               </a:rPr>
               <a:pPr/>
-              <a:t>9/24/18</a:t>
+              <a:t>9/27/18</a:t>
             </a:fld>
             <a:endParaRPr lang="en-US">
               <a:solidFill>
@@ -14171,7 +14173,7 @@
                 </a:solidFill>
               </a:rPr>
               <a:pPr/>
-              <a:t>9/24/18</a:t>
+              <a:t>9/27/18</a:t>
             </a:fld>
             <a:endParaRPr lang="en-US">
               <a:solidFill>
@@ -14320,7 +14322,7 @@
                 </a:solidFill>
               </a:rPr>
               <a:pPr/>
-              <a:t>9/24/18</a:t>
+              <a:t>9/27/18</a:t>
             </a:fld>
             <a:endParaRPr lang="en-US">
               <a:solidFill>
@@ -14447,7 +14449,7 @@
                 </a:solidFill>
               </a:rPr>
               <a:pPr/>
-              <a:t>9/24/18</a:t>
+              <a:t>9/27/18</a:t>
             </a:fld>
             <a:endParaRPr lang="en-US">
               <a:solidFill>
@@ -14754,7 +14756,7 @@
                 </a:solidFill>
               </a:rPr>
               <a:pPr/>
-              <a:t>9/24/18</a:t>
+              <a:t>9/27/18</a:t>
             </a:fld>
             <a:endParaRPr lang="en-US">
               <a:solidFill>
@@ -15041,7 +15043,7 @@
                 </a:solidFill>
               </a:rPr>
               <a:pPr/>
-              <a:t>9/24/18</a:t>
+              <a:t>9/27/18</a:t>
             </a:fld>
             <a:endParaRPr lang="en-US">
               <a:solidFill>
@@ -15284,7 +15286,7 @@
                 </a:solidFill>
               </a:rPr>
               <a:pPr/>
-              <a:t>9/24/18</a:t>
+              <a:t>9/27/18</a:t>
             </a:fld>
             <a:endParaRPr lang="en-US">
               <a:solidFill>
@@ -15825,7 +15827,7 @@
                 </a:solidFill>
               </a:rPr>
               <a:pPr/>
-              <a:t>9/24/18</a:t>
+              <a:t>9/27/18</a:t>
             </a:fld>
             <a:endParaRPr lang="en-US">
               <a:solidFill>
@@ -16479,7 +16481,7 @@
                 </a:solidFill>
               </a:rPr>
               <a:pPr/>
-              <a:t>9/24/18</a:t>
+              <a:t>9/27/18</a:t>
             </a:fld>
             <a:endParaRPr lang="en-US">
               <a:solidFill>
@@ -35426,1088 +35428,104 @@
           <a:chExt cx="0" cy="0"/>
         </a:xfrm>
       </p:grpSpPr>
-      <p:sp>
-        <p:nvSpPr>
-          <p:cNvPr id="8" name="TextBox 7"/>
-          <p:cNvSpPr txBox="1"/>
-          <p:nvPr/>
-        </p:nvSpPr>
-        <p:spPr>
-          <a:xfrm>
-            <a:off x="304800" y="1522907"/>
-            <a:ext cx="7314247" cy="461665"/>
-          </a:xfrm>
-          <a:prstGeom prst="rect">
-            <a:avLst/>
-          </a:prstGeom>
-          <a:noFill/>
-        </p:spPr>
-        <p:txBody>
-          <a:bodyPr wrap="square" rtlCol="0">
-            <a:spAutoFit/>
-          </a:bodyPr>
-          <a:lstStyle/>
-          <a:p>
-            <a:r>
-              <a:rPr lang="en-US" sz="2400" dirty="0"/>
-              <a:t>Intuition: If 1 parameter</a:t>
-            </a:r>
-          </a:p>
-        </p:txBody>
-      </p:sp>
-      <p:sp>
-        <p:nvSpPr>
-          <p:cNvPr id="4" name="Rectangle 3"/>
-          <p:cNvSpPr/>
-          <p:nvPr/>
-        </p:nvSpPr>
-        <p:spPr>
-          <a:xfrm>
-            <a:off x="304800" y="4481800"/>
-            <a:ext cx="2057400" cy="528350"/>
-          </a:xfrm>
-          <a:prstGeom prst="rect">
-            <a:avLst/>
-          </a:prstGeom>
-        </p:spPr>
-        <p:txBody>
-          <a:bodyPr wrap="square">
-            <a:spAutoFit/>
-          </a:bodyPr>
-          <a:lstStyle/>
-          <a:p>
-            <a:pPr>
-              <a:lnSpc>
-                <a:spcPts val="3360"/>
-              </a:lnSpc>
-            </a:pPr>
-            <a:r>
-              <a:rPr lang="en-US" sz="2400" dirty="0"/>
-              <a:t>Solve for </a:t>
-            </a:r>
-          </a:p>
-        </p:txBody>
-      </p:sp>
       <p:pic>
         <p:nvPicPr>
-          <p:cNvPr id="20" name="Picture 19"/>
+          <p:cNvPr id="2" name="Picture 1">
+            <a:extLst>
+              <a:ext uri="{FF2B5EF4-FFF2-40B4-BE49-F238E27FC236}">
+                <a16:creationId xmlns:a16="http://schemas.microsoft.com/office/drawing/2014/main" id="{BCE931AD-76BF-4B45-88B6-4764EB865695}"/>
+              </a:ext>
+            </a:extLst>
+          </p:cNvPr>
           <p:cNvPicPr>
             <a:picLocks noChangeAspect="1"/>
           </p:cNvPicPr>
-          <p:nvPr>
-            <p:custDataLst>
-              <p:tags r:id="rId1"/>
-            </p:custDataLst>
-          </p:nvPr>
+          <p:nvPr/>
         </p:nvPicPr>
         <p:blipFill>
-          <a:blip r:embed="rId11" cstate="print">
-            <a:extLst>
-              <a:ext uri="{28A0092B-C50C-407E-A947-70E740481C1C}">
-                <a14:useLocalDpi xmlns:a14="http://schemas.microsoft.com/office/drawing/2010/main" val="0"/>
-              </a:ext>
-            </a:extLst>
-          </a:blip>
+          <a:blip r:embed="rId2"/>
           <a:stretch>
             <a:fillRect/>
           </a:stretch>
         </p:blipFill>
         <p:spPr>
           <a:xfrm>
-            <a:off x="838201" y="2090166"/>
-            <a:ext cx="2574036" cy="329184"/>
+            <a:off x="774700" y="266700"/>
+            <a:ext cx="7594600" cy="4610100"/>
           </a:xfrm>
           <a:prstGeom prst="rect">
             <a:avLst/>
           </a:prstGeom>
         </p:spPr>
       </p:pic>
-      <p:cxnSp>
-        <p:nvCxnSpPr>
-          <p:cNvPr id="14" name="Straight Connector 13"/>
-          <p:cNvCxnSpPr/>
-          <p:nvPr/>
-        </p:nvCxnSpPr>
-        <p:spPr>
-          <a:xfrm flipV="1">
-            <a:off x="6011011" y="482104"/>
-            <a:ext cx="0" cy="1727136"/>
-          </a:xfrm>
-          <a:prstGeom prst="line">
-            <a:avLst/>
-          </a:prstGeom>
-          <a:ln w="38100">
-            <a:solidFill>
-              <a:schemeClr val="tx1"/>
-            </a:solidFill>
-            <a:tailEnd type="arrow" w="lg" len="med"/>
-          </a:ln>
-        </p:spPr>
-        <p:style>
-          <a:lnRef idx="1">
-            <a:schemeClr val="accent1"/>
-          </a:lnRef>
-          <a:fillRef idx="0">
-            <a:schemeClr val="accent1"/>
-          </a:fillRef>
-          <a:effectRef idx="0">
-            <a:schemeClr val="accent1"/>
-          </a:effectRef>
-          <a:fontRef idx="minor">
-            <a:schemeClr val="tx1"/>
-          </a:fontRef>
-        </p:style>
-      </p:cxnSp>
-      <p:cxnSp>
-        <p:nvCxnSpPr>
-          <p:cNvPr id="15" name="Straight Connector 14"/>
-          <p:cNvCxnSpPr/>
-          <p:nvPr/>
-        </p:nvCxnSpPr>
-        <p:spPr>
-          <a:xfrm>
-            <a:off x="5867400" y="2041755"/>
-            <a:ext cx="2164713" cy="0"/>
-          </a:xfrm>
-          <a:prstGeom prst="line">
-            <a:avLst/>
-          </a:prstGeom>
-          <a:ln w="38100">
-            <a:solidFill>
-              <a:schemeClr val="tx1"/>
-            </a:solidFill>
-            <a:tailEnd type="arrow" w="lg" len="med"/>
-          </a:ln>
-        </p:spPr>
-        <p:style>
-          <a:lnRef idx="1">
-            <a:schemeClr val="accent1"/>
-          </a:lnRef>
-          <a:fillRef idx="0">
-            <a:schemeClr val="accent1"/>
-          </a:fillRef>
-          <a:effectRef idx="0">
-            <a:schemeClr val="accent1"/>
-          </a:effectRef>
-          <a:fontRef idx="minor">
-            <a:schemeClr val="tx1"/>
-          </a:fontRef>
-        </p:style>
-      </p:cxnSp>
-      <p:pic>
-        <p:nvPicPr>
-          <p:cNvPr id="16" name="Picture 15"/>
-          <p:cNvPicPr>
-            <a:picLocks noChangeAspect="1"/>
-          </p:cNvPicPr>
-          <p:nvPr>
-            <p:custDataLst>
-              <p:tags r:id="rId2"/>
-            </p:custDataLst>
-          </p:nvPr>
-        </p:nvPicPr>
-        <p:blipFill>
-          <a:blip r:embed="rId12" cstate="print">
+      <p:sp>
+        <p:nvSpPr>
+          <p:cNvPr id="3" name="TextBox 2">
             <a:extLst>
-              <a:ext uri="{28A0092B-C50C-407E-A947-70E740481C1C}">
-                <a14:useLocalDpi xmlns:a14="http://schemas.microsoft.com/office/drawing/2010/main" val="0"/>
+              <a:ext uri="{FF2B5EF4-FFF2-40B4-BE49-F238E27FC236}">
+                <a16:creationId xmlns:a16="http://schemas.microsoft.com/office/drawing/2014/main" id="{F1B6F159-F3A3-E346-A513-C431565864CB}"/>
               </a:ext>
             </a:extLst>
-          </a:blip>
-          <a:stretch>
-            <a:fillRect/>
-          </a:stretch>
-        </p:blipFill>
-        <p:spPr>
-          <a:xfrm>
-            <a:off x="6874431" y="2132867"/>
-            <a:ext cx="104411" cy="160784"/>
-          </a:xfrm>
-          <a:prstGeom prst="rect">
-            <a:avLst/>
-          </a:prstGeom>
-        </p:spPr>
-      </p:pic>
-      <p:pic>
-        <p:nvPicPr>
-          <p:cNvPr id="18" name="Picture 17"/>
-          <p:cNvPicPr>
-            <a:picLocks noChangeAspect="1"/>
-          </p:cNvPicPr>
-          <p:nvPr>
-            <p:custDataLst>
-              <p:tags r:id="rId3"/>
-            </p:custDataLst>
-          </p:nvPr>
-        </p:nvPicPr>
-        <p:blipFill>
-          <a:blip r:embed="rId13" cstate="print">
-            <a:extLst>
-              <a:ext uri="{28A0092B-C50C-407E-A947-70E740481C1C}">
-                <a14:useLocalDpi xmlns:a14="http://schemas.microsoft.com/office/drawing/2010/main" val="0"/>
-              </a:ext>
-            </a:extLst>
-          </a:blip>
-          <a:stretch>
-            <a:fillRect/>
-          </a:stretch>
-        </p:blipFill>
-        <p:spPr>
-          <a:xfrm>
-            <a:off x="7813968" y="869374"/>
-            <a:ext cx="436290" cy="224427"/>
-          </a:xfrm>
-          <a:prstGeom prst="rect">
-            <a:avLst/>
-          </a:prstGeom>
-        </p:spPr>
-      </p:pic>
-      <p:cxnSp>
-        <p:nvCxnSpPr>
-          <p:cNvPr id="23" name="Straight Connector 22"/>
-          <p:cNvCxnSpPr/>
-          <p:nvPr/>
-        </p:nvCxnSpPr>
-        <p:spPr>
-          <a:xfrm>
-            <a:off x="381000" y="2876550"/>
-            <a:ext cx="8305800" cy="0"/>
-          </a:xfrm>
-          <a:prstGeom prst="line">
-            <a:avLst/>
-          </a:prstGeom>
-        </p:spPr>
-        <p:style>
-          <a:lnRef idx="1">
-            <a:schemeClr val="dk1"/>
-          </a:lnRef>
-          <a:fillRef idx="0">
-            <a:schemeClr val="dk1"/>
-          </a:fillRef>
-          <a:effectRef idx="0">
-            <a:schemeClr val="dk1"/>
-          </a:effectRef>
-          <a:fontRef idx="minor">
-            <a:schemeClr val="tx1"/>
-          </a:fontRef>
-        </p:style>
-      </p:cxnSp>
-      <p:pic>
-        <p:nvPicPr>
-          <p:cNvPr id="31" name="Picture 30"/>
-          <p:cNvPicPr>
-            <a:picLocks noChangeAspect="1"/>
-          </p:cNvPicPr>
-          <p:nvPr>
-            <p:custDataLst>
-              <p:tags r:id="rId4"/>
-            </p:custDataLst>
-          </p:nvPr>
-        </p:nvPicPr>
-        <p:blipFill>
-          <a:blip r:embed="rId14" cstate="print">
-            <a:extLst>
-              <a:ext uri="{28A0092B-C50C-407E-A947-70E740481C1C}">
-                <a14:useLocalDpi xmlns:a14="http://schemas.microsoft.com/office/drawing/2010/main" val="0"/>
-              </a:ext>
-            </a:extLst>
-          </a:blip>
-          <a:stretch>
-            <a:fillRect/>
-          </a:stretch>
-        </p:blipFill>
-        <p:spPr>
-          <a:xfrm>
-            <a:off x="2438400" y="3001385"/>
-            <a:ext cx="5719572" cy="832104"/>
-          </a:xfrm>
-          <a:prstGeom prst="rect">
-            <a:avLst/>
-          </a:prstGeom>
-        </p:spPr>
-      </p:pic>
-      <p:pic>
-        <p:nvPicPr>
-          <p:cNvPr id="6" name="Picture 5"/>
-          <p:cNvPicPr>
-            <a:picLocks noChangeAspect="1"/>
-          </p:cNvPicPr>
-          <p:nvPr>
-            <p:custDataLst>
-              <p:tags r:id="rId5"/>
-            </p:custDataLst>
-          </p:nvPr>
-        </p:nvPicPr>
-        <p:blipFill>
-          <a:blip r:embed="rId15" cstate="print">
-            <a:extLst>
-              <a:ext uri="{28A0092B-C50C-407E-A947-70E740481C1C}">
-                <a14:useLocalDpi xmlns:a14="http://schemas.microsoft.com/office/drawing/2010/main" val="0"/>
-              </a:ext>
-            </a:extLst>
-          </a:blip>
-          <a:stretch>
-            <a:fillRect/>
-          </a:stretch>
-        </p:blipFill>
-        <p:spPr>
-          <a:xfrm>
-            <a:off x="1042416" y="3947587"/>
-            <a:ext cx="2299716" cy="436626"/>
-          </a:xfrm>
-          <a:prstGeom prst="rect">
-            <a:avLst/>
-          </a:prstGeom>
-        </p:spPr>
-      </p:pic>
-      <p:sp>
-        <p:nvSpPr>
-          <p:cNvPr id="33" name="Rectangle 32"/>
-          <p:cNvSpPr/>
-          <p:nvPr/>
-        </p:nvSpPr>
-        <p:spPr>
-          <a:xfrm>
-            <a:off x="3679751" y="3833489"/>
-            <a:ext cx="3336036" cy="500586"/>
-          </a:xfrm>
-          <a:prstGeom prst="rect">
-            <a:avLst/>
-          </a:prstGeom>
-        </p:spPr>
-        <p:txBody>
-          <a:bodyPr wrap="square">
-            <a:spAutoFit/>
-          </a:bodyPr>
-          <a:lstStyle/>
-          <a:p>
-            <a:pPr>
-              <a:lnSpc>
-                <a:spcPts val="3360"/>
-              </a:lnSpc>
-            </a:pPr>
-            <a:r>
-              <a:rPr lang="en-US" sz="2400" dirty="0"/>
-              <a:t>(for every   )</a:t>
-            </a:r>
-          </a:p>
-        </p:txBody>
-      </p:sp>
-      <p:pic>
-        <p:nvPicPr>
-          <p:cNvPr id="35" name="Picture 34"/>
-          <p:cNvPicPr>
-            <a:picLocks noChangeAspect="1"/>
-          </p:cNvPicPr>
-          <p:nvPr>
-            <p:custDataLst>
-              <p:tags r:id="rId6"/>
-            </p:custDataLst>
-          </p:nvPr>
-        </p:nvPicPr>
-        <p:blipFill>
-          <a:blip r:embed="rId16" cstate="print">
-            <a:extLst>
-              <a:ext uri="{28A0092B-C50C-407E-A947-70E740481C1C}">
-                <a14:useLocalDpi xmlns:a14="http://schemas.microsoft.com/office/drawing/2010/main" val="0"/>
-              </a:ext>
-            </a:extLst>
-          </a:blip>
-          <a:stretch>
-            <a:fillRect/>
-          </a:stretch>
-        </p:blipFill>
-        <p:spPr>
-          <a:xfrm>
-            <a:off x="5038165" y="4012135"/>
-            <a:ext cx="125730" cy="262890"/>
-          </a:xfrm>
-          <a:prstGeom prst="rect">
-            <a:avLst/>
-          </a:prstGeom>
-        </p:spPr>
-      </p:pic>
-      <p:pic>
-        <p:nvPicPr>
-          <p:cNvPr id="37" name="Picture 36"/>
-          <p:cNvPicPr>
-            <a:picLocks noChangeAspect="1"/>
-          </p:cNvPicPr>
-          <p:nvPr>
-            <p:custDataLst>
-              <p:tags r:id="rId7"/>
-            </p:custDataLst>
-          </p:nvPr>
-        </p:nvPicPr>
-        <p:blipFill>
-          <a:blip r:embed="rId17" cstate="print">
-            <a:extLst>
-              <a:ext uri="{28A0092B-C50C-407E-A947-70E740481C1C}">
-                <a14:useLocalDpi xmlns:a14="http://schemas.microsoft.com/office/drawing/2010/main" val="0"/>
-              </a:ext>
-            </a:extLst>
-          </a:blip>
-          <a:stretch>
-            <a:fillRect/>
-          </a:stretch>
-        </p:blipFill>
-        <p:spPr>
-          <a:xfrm>
-            <a:off x="1618869" y="4634567"/>
-            <a:ext cx="1639062" cy="276606"/>
-          </a:xfrm>
-          <a:prstGeom prst="rect">
-            <a:avLst/>
-          </a:prstGeom>
-        </p:spPr>
-      </p:pic>
-      <p:grpSp>
-        <p:nvGrpSpPr>
-          <p:cNvPr id="2" name="Group 1"/>
-          <p:cNvGrpSpPr/>
-          <p:nvPr/>
-        </p:nvGrpSpPr>
-        <p:grpSpPr>
-          <a:xfrm>
-            <a:off x="6172200" y="833140"/>
-            <a:ext cx="1524880" cy="1052810"/>
-            <a:chOff x="5137487" y="1006891"/>
-            <a:chExt cx="2015567" cy="1391591"/>
-          </a:xfrm>
-        </p:grpSpPr>
-        <p:sp>
-          <p:nvSpPr>
-            <p:cNvPr id="22" name="Freeform 21"/>
-            <p:cNvSpPr/>
-            <p:nvPr/>
-          </p:nvSpPr>
-          <p:spPr>
-            <a:xfrm>
-              <a:off x="5137487" y="1007182"/>
-              <a:ext cx="1041121" cy="1391300"/>
-            </a:xfrm>
-            <a:custGeom>
-              <a:avLst/>
-              <a:gdLst>
-                <a:gd name="connsiteX0" fmla="*/ 0 w 2667000"/>
-                <a:gd name="connsiteY0" fmla="*/ 0 h 2076450"/>
-                <a:gd name="connsiteX1" fmla="*/ 800100 w 2667000"/>
-                <a:gd name="connsiteY1" fmla="*/ 1724025 h 2076450"/>
-                <a:gd name="connsiteX2" fmla="*/ 2667000 w 2667000"/>
-                <a:gd name="connsiteY2" fmla="*/ 2076450 h 2076450"/>
-                <a:gd name="connsiteX0" fmla="*/ 0 w 1819275"/>
-                <a:gd name="connsiteY0" fmla="*/ 0 h 2085975"/>
-                <a:gd name="connsiteX1" fmla="*/ 800100 w 1819275"/>
-                <a:gd name="connsiteY1" fmla="*/ 1724025 h 2085975"/>
-                <a:gd name="connsiteX2" fmla="*/ 1819275 w 1819275"/>
-                <a:gd name="connsiteY2" fmla="*/ 2085975 h 2085975"/>
-                <a:gd name="connsiteX0" fmla="*/ 0 w 1819275"/>
-                <a:gd name="connsiteY0" fmla="*/ 0 h 2085975"/>
-                <a:gd name="connsiteX1" fmla="*/ 609600 w 1819275"/>
-                <a:gd name="connsiteY1" fmla="*/ 1504950 h 2085975"/>
-                <a:gd name="connsiteX2" fmla="*/ 1819275 w 1819275"/>
-                <a:gd name="connsiteY2" fmla="*/ 2085975 h 2085975"/>
-                <a:gd name="connsiteX0" fmla="*/ 0 w 1819275"/>
-                <a:gd name="connsiteY0" fmla="*/ 0 h 2085975"/>
-                <a:gd name="connsiteX1" fmla="*/ 609600 w 1819275"/>
-                <a:gd name="connsiteY1" fmla="*/ 1504950 h 2085975"/>
-                <a:gd name="connsiteX2" fmla="*/ 1819275 w 1819275"/>
-                <a:gd name="connsiteY2" fmla="*/ 2085975 h 2085975"/>
-                <a:gd name="connsiteX0" fmla="*/ 0 w 1819275"/>
-                <a:gd name="connsiteY0" fmla="*/ 0 h 2087456"/>
-                <a:gd name="connsiteX1" fmla="*/ 609600 w 1819275"/>
-                <a:gd name="connsiteY1" fmla="*/ 1504950 h 2087456"/>
-                <a:gd name="connsiteX2" fmla="*/ 1819275 w 1819275"/>
-                <a:gd name="connsiteY2" fmla="*/ 2085975 h 2087456"/>
-                <a:gd name="connsiteX0" fmla="*/ 0 w 1590675"/>
-                <a:gd name="connsiteY0" fmla="*/ 0 h 2124809"/>
-                <a:gd name="connsiteX1" fmla="*/ 381000 w 1590675"/>
-                <a:gd name="connsiteY1" fmla="*/ 1543050 h 2124809"/>
-                <a:gd name="connsiteX2" fmla="*/ 1590675 w 1590675"/>
-                <a:gd name="connsiteY2" fmla="*/ 2124075 h 2124809"/>
-                <a:gd name="connsiteX0" fmla="*/ 2321 w 1592996"/>
-                <a:gd name="connsiteY0" fmla="*/ 0 h 2124809"/>
-                <a:gd name="connsiteX1" fmla="*/ 383321 w 1592996"/>
-                <a:gd name="connsiteY1" fmla="*/ 1543050 h 2124809"/>
-                <a:gd name="connsiteX2" fmla="*/ 1592996 w 1592996"/>
-                <a:gd name="connsiteY2" fmla="*/ 2124075 h 2124809"/>
-                <a:gd name="connsiteX0" fmla="*/ 0 w 1590675"/>
-                <a:gd name="connsiteY0" fmla="*/ 0 h 2124809"/>
-                <a:gd name="connsiteX1" fmla="*/ 381000 w 1590675"/>
-                <a:gd name="connsiteY1" fmla="*/ 1543050 h 2124809"/>
-                <a:gd name="connsiteX2" fmla="*/ 1590675 w 1590675"/>
-                <a:gd name="connsiteY2" fmla="*/ 2124075 h 2124809"/>
-                <a:gd name="connsiteX0" fmla="*/ 0 w 1590675"/>
-                <a:gd name="connsiteY0" fmla="*/ 0 h 2124675"/>
-                <a:gd name="connsiteX1" fmla="*/ 468316 w 1590675"/>
-                <a:gd name="connsiteY1" fmla="*/ 1484839 h 2124675"/>
-                <a:gd name="connsiteX2" fmla="*/ 1590675 w 1590675"/>
-                <a:gd name="connsiteY2" fmla="*/ 2124075 h 2124675"/>
-                <a:gd name="connsiteX0" fmla="*/ 0 w 1590675"/>
-                <a:gd name="connsiteY0" fmla="*/ 0 h 2125697"/>
-                <a:gd name="connsiteX1" fmla="*/ 555633 w 1590675"/>
-                <a:gd name="connsiteY1" fmla="*/ 1688578 h 2125697"/>
-                <a:gd name="connsiteX2" fmla="*/ 1590675 w 1590675"/>
-                <a:gd name="connsiteY2" fmla="*/ 2124075 h 2125697"/>
-              </a:gdLst>
-              <a:ahLst/>
-              <a:cxnLst>
-                <a:cxn ang="0">
-                  <a:pos x="connsiteX0" y="connsiteY0"/>
-                </a:cxn>
-                <a:cxn ang="0">
-                  <a:pos x="connsiteX1" y="connsiteY1"/>
-                </a:cxn>
-                <a:cxn ang="0">
-                  <a:pos x="connsiteX2" y="connsiteY2"/>
-                </a:cxn>
-              </a:cxnLst>
-              <a:rect l="l" t="t" r="r" b="b"/>
-              <a:pathLst>
-                <a:path w="1590675" h="2125697">
-                  <a:moveTo>
-                    <a:pt x="0" y="0"/>
-                  </a:moveTo>
-                  <a:cubicBezTo>
-                    <a:pt x="25400" y="917575"/>
-                    <a:pt x="290521" y="1334566"/>
-                    <a:pt x="555633" y="1688578"/>
-                  </a:cubicBezTo>
-                  <a:cubicBezTo>
-                    <a:pt x="820745" y="2042590"/>
-                    <a:pt x="1250950" y="2139950"/>
-                    <a:pt x="1590675" y="2124075"/>
-                  </a:cubicBezTo>
-                </a:path>
-              </a:pathLst>
-            </a:custGeom>
-            <a:noFill/>
-          </p:spPr>
-          <p:style>
-            <a:lnRef idx="2">
-              <a:schemeClr val="accent1">
-                <a:shade val="50000"/>
-              </a:schemeClr>
-            </a:lnRef>
-            <a:fillRef idx="1">
-              <a:schemeClr val="accent1"/>
-            </a:fillRef>
-            <a:effectRef idx="0">
-              <a:schemeClr val="accent1"/>
-            </a:effectRef>
-            <a:fontRef idx="minor">
-              <a:schemeClr val="lt1"/>
-            </a:fontRef>
-          </p:style>
-          <p:txBody>
-            <a:bodyPr rtlCol="0" anchor="ctr"/>
-            <a:lstStyle/>
-            <a:p>
-              <a:pPr algn="ctr"/>
-              <a:endParaRPr lang="en-US"/>
-            </a:p>
-          </p:txBody>
-        </p:sp>
-        <p:sp>
-          <p:nvSpPr>
-            <p:cNvPr id="24" name="Freeform 23"/>
-            <p:cNvSpPr/>
-            <p:nvPr/>
-          </p:nvSpPr>
-          <p:spPr>
-            <a:xfrm flipH="1">
-              <a:off x="6111933" y="1006891"/>
-              <a:ext cx="1041121" cy="1391300"/>
-            </a:xfrm>
-            <a:custGeom>
-              <a:avLst/>
-              <a:gdLst>
-                <a:gd name="connsiteX0" fmla="*/ 0 w 2667000"/>
-                <a:gd name="connsiteY0" fmla="*/ 0 h 2076450"/>
-                <a:gd name="connsiteX1" fmla="*/ 800100 w 2667000"/>
-                <a:gd name="connsiteY1" fmla="*/ 1724025 h 2076450"/>
-                <a:gd name="connsiteX2" fmla="*/ 2667000 w 2667000"/>
-                <a:gd name="connsiteY2" fmla="*/ 2076450 h 2076450"/>
-                <a:gd name="connsiteX0" fmla="*/ 0 w 1819275"/>
-                <a:gd name="connsiteY0" fmla="*/ 0 h 2085975"/>
-                <a:gd name="connsiteX1" fmla="*/ 800100 w 1819275"/>
-                <a:gd name="connsiteY1" fmla="*/ 1724025 h 2085975"/>
-                <a:gd name="connsiteX2" fmla="*/ 1819275 w 1819275"/>
-                <a:gd name="connsiteY2" fmla="*/ 2085975 h 2085975"/>
-                <a:gd name="connsiteX0" fmla="*/ 0 w 1819275"/>
-                <a:gd name="connsiteY0" fmla="*/ 0 h 2085975"/>
-                <a:gd name="connsiteX1" fmla="*/ 609600 w 1819275"/>
-                <a:gd name="connsiteY1" fmla="*/ 1504950 h 2085975"/>
-                <a:gd name="connsiteX2" fmla="*/ 1819275 w 1819275"/>
-                <a:gd name="connsiteY2" fmla="*/ 2085975 h 2085975"/>
-                <a:gd name="connsiteX0" fmla="*/ 0 w 1819275"/>
-                <a:gd name="connsiteY0" fmla="*/ 0 h 2085975"/>
-                <a:gd name="connsiteX1" fmla="*/ 609600 w 1819275"/>
-                <a:gd name="connsiteY1" fmla="*/ 1504950 h 2085975"/>
-                <a:gd name="connsiteX2" fmla="*/ 1819275 w 1819275"/>
-                <a:gd name="connsiteY2" fmla="*/ 2085975 h 2085975"/>
-                <a:gd name="connsiteX0" fmla="*/ 0 w 1819275"/>
-                <a:gd name="connsiteY0" fmla="*/ 0 h 2087456"/>
-                <a:gd name="connsiteX1" fmla="*/ 609600 w 1819275"/>
-                <a:gd name="connsiteY1" fmla="*/ 1504950 h 2087456"/>
-                <a:gd name="connsiteX2" fmla="*/ 1819275 w 1819275"/>
-                <a:gd name="connsiteY2" fmla="*/ 2085975 h 2087456"/>
-                <a:gd name="connsiteX0" fmla="*/ 0 w 1590675"/>
-                <a:gd name="connsiteY0" fmla="*/ 0 h 2124809"/>
-                <a:gd name="connsiteX1" fmla="*/ 381000 w 1590675"/>
-                <a:gd name="connsiteY1" fmla="*/ 1543050 h 2124809"/>
-                <a:gd name="connsiteX2" fmla="*/ 1590675 w 1590675"/>
-                <a:gd name="connsiteY2" fmla="*/ 2124075 h 2124809"/>
-                <a:gd name="connsiteX0" fmla="*/ 2321 w 1592996"/>
-                <a:gd name="connsiteY0" fmla="*/ 0 h 2124809"/>
-                <a:gd name="connsiteX1" fmla="*/ 383321 w 1592996"/>
-                <a:gd name="connsiteY1" fmla="*/ 1543050 h 2124809"/>
-                <a:gd name="connsiteX2" fmla="*/ 1592996 w 1592996"/>
-                <a:gd name="connsiteY2" fmla="*/ 2124075 h 2124809"/>
-                <a:gd name="connsiteX0" fmla="*/ 0 w 1590675"/>
-                <a:gd name="connsiteY0" fmla="*/ 0 h 2124809"/>
-                <a:gd name="connsiteX1" fmla="*/ 381000 w 1590675"/>
-                <a:gd name="connsiteY1" fmla="*/ 1543050 h 2124809"/>
-                <a:gd name="connsiteX2" fmla="*/ 1590675 w 1590675"/>
-                <a:gd name="connsiteY2" fmla="*/ 2124075 h 2124809"/>
-                <a:gd name="connsiteX0" fmla="*/ 0 w 1590675"/>
-                <a:gd name="connsiteY0" fmla="*/ 0 h 2124675"/>
-                <a:gd name="connsiteX1" fmla="*/ 468316 w 1590675"/>
-                <a:gd name="connsiteY1" fmla="*/ 1484839 h 2124675"/>
-                <a:gd name="connsiteX2" fmla="*/ 1590675 w 1590675"/>
-                <a:gd name="connsiteY2" fmla="*/ 2124075 h 2124675"/>
-                <a:gd name="connsiteX0" fmla="*/ 0 w 1590675"/>
-                <a:gd name="connsiteY0" fmla="*/ 0 h 2125697"/>
-                <a:gd name="connsiteX1" fmla="*/ 555633 w 1590675"/>
-                <a:gd name="connsiteY1" fmla="*/ 1688578 h 2125697"/>
-                <a:gd name="connsiteX2" fmla="*/ 1590675 w 1590675"/>
-                <a:gd name="connsiteY2" fmla="*/ 2124075 h 2125697"/>
-              </a:gdLst>
-              <a:ahLst/>
-              <a:cxnLst>
-                <a:cxn ang="0">
-                  <a:pos x="connsiteX0" y="connsiteY0"/>
-                </a:cxn>
-                <a:cxn ang="0">
-                  <a:pos x="connsiteX1" y="connsiteY1"/>
-                </a:cxn>
-                <a:cxn ang="0">
-                  <a:pos x="connsiteX2" y="connsiteY2"/>
-                </a:cxn>
-              </a:cxnLst>
-              <a:rect l="l" t="t" r="r" b="b"/>
-              <a:pathLst>
-                <a:path w="1590675" h="2125697">
-                  <a:moveTo>
-                    <a:pt x="0" y="0"/>
-                  </a:moveTo>
-                  <a:cubicBezTo>
-                    <a:pt x="25400" y="917575"/>
-                    <a:pt x="290521" y="1334566"/>
-                    <a:pt x="555633" y="1688578"/>
-                  </a:cubicBezTo>
-                  <a:cubicBezTo>
-                    <a:pt x="820745" y="2042590"/>
-                    <a:pt x="1250950" y="2139950"/>
-                    <a:pt x="1590675" y="2124075"/>
-                  </a:cubicBezTo>
-                </a:path>
-              </a:pathLst>
-            </a:custGeom>
-            <a:noFill/>
-          </p:spPr>
-          <p:style>
-            <a:lnRef idx="2">
-              <a:schemeClr val="accent1">
-                <a:shade val="50000"/>
-              </a:schemeClr>
-            </a:lnRef>
-            <a:fillRef idx="1">
-              <a:schemeClr val="accent1"/>
-            </a:fillRef>
-            <a:effectRef idx="0">
-              <a:schemeClr val="accent1"/>
-            </a:effectRef>
-            <a:fontRef idx="minor">
-              <a:schemeClr val="lt1"/>
-            </a:fontRef>
-          </p:style>
-          <p:txBody>
-            <a:bodyPr rtlCol="0" anchor="ctr"/>
-            <a:lstStyle/>
-            <a:p>
-              <a:pPr algn="ctr"/>
-              <a:endParaRPr lang="en-US"/>
-            </a:p>
-          </p:txBody>
-        </p:sp>
-      </p:grpSp>
-      <p:sp>
-        <p:nvSpPr>
-          <p:cNvPr id="26" name="TextBox 25"/>
+          </p:cNvPr>
           <p:cNvSpPr txBox="1"/>
           <p:nvPr/>
         </p:nvSpPr>
         <p:spPr>
           <a:xfrm>
-            <a:off x="304800" y="285750"/>
-            <a:ext cx="7314247" cy="830997"/>
+            <a:off x="152400" y="3790950"/>
+            <a:ext cx="1879041" cy="1200329"/>
           </a:xfrm>
           <a:prstGeom prst="rect">
             <a:avLst/>
           </a:prstGeom>
           <a:noFill/>
+          <a:ln>
+            <a:solidFill>
+              <a:schemeClr val="accent1"/>
+            </a:solidFill>
+          </a:ln>
         </p:spPr>
         <p:txBody>
-          <a:bodyPr wrap="square" rtlCol="0">
+          <a:bodyPr wrap="none" rtlCol="0">
             <a:spAutoFit/>
           </a:bodyPr>
           <a:lstStyle/>
           <a:p>
             <a:r>
-              <a:rPr lang="en-US" sz="2400" dirty="0"/>
-              <a:t>Normal equation: Method to solve for </a:t>
-            </a:r>
-          </a:p>
-          <a:p>
-            <a:r>
-              <a:rPr lang="en-US" sz="2400" dirty="0"/>
-              <a:t>analytically.</a:t>
+              <a:rPr lang="en-US" dirty="0"/>
+              <a:t>Least squared </a:t>
+            </a:r>
+          </a:p>
+          <a:p>
+            <a:r>
+              <a:rPr lang="en-US" dirty="0"/>
+              <a:t>provides analytic</a:t>
+            </a:r>
+          </a:p>
+          <a:p>
+            <a:r>
+              <a:rPr lang="en-US" dirty="0"/>
+              <a:t>solution with one </a:t>
+            </a:r>
+          </a:p>
+          <a:p>
+            <a:r>
+              <a:rPr lang="en-US" dirty="0"/>
+              <a:t>predictor</a:t>
             </a:r>
           </a:p>
         </p:txBody>
       </p:sp>
-      <p:pic>
-        <p:nvPicPr>
-          <p:cNvPr id="27" name="Picture 26"/>
-          <p:cNvPicPr>
-            <a:picLocks noChangeAspect="1"/>
-          </p:cNvPicPr>
-          <p:nvPr>
-            <p:custDataLst>
-              <p:tags r:id="rId8"/>
-            </p:custDataLst>
-          </p:nvPr>
-        </p:nvPicPr>
-        <p:blipFill>
-          <a:blip r:embed="rId18" cstate="print">
-            <a:extLst>
-              <a:ext uri="{28A0092B-C50C-407E-A947-70E740481C1C}">
-                <a14:useLocalDpi xmlns:a14="http://schemas.microsoft.com/office/drawing/2010/main" val="0"/>
-              </a:ext>
-            </a:extLst>
-          </a:blip>
-          <a:stretch>
-            <a:fillRect/>
-          </a:stretch>
-        </p:blipFill>
-        <p:spPr>
-          <a:xfrm>
-            <a:off x="533400" y="3257550"/>
-            <a:ext cx="918972" cy="306324"/>
-          </a:xfrm>
-          <a:prstGeom prst="rect">
-            <a:avLst/>
-          </a:prstGeom>
-        </p:spPr>
-      </p:pic>
     </p:spTree>
     <p:extLst>
       <p:ext uri="{BB962C8B-B14F-4D97-AF65-F5344CB8AC3E}">
-        <p14:creationId xmlns:p14="http://schemas.microsoft.com/office/powerpoint/2010/main" val="3694999254"/>
+        <p14:creationId xmlns:p14="http://schemas.microsoft.com/office/powerpoint/2010/main" val="1159077669"/>
       </p:ext>
     </p:extLst>
   </p:cSld>
   <p:clrMapOvr>
     <a:masterClrMapping/>
   </p:clrMapOvr>
-  <p:timing>
-    <p:tnLst>
-      <p:par>
-        <p:cTn id="1" dur="indefinite" restart="never" nodeType="tmRoot">
-          <p:childTnLst>
-            <p:seq concurrent="1" nextAc="seek">
-              <p:cTn id="2" dur="indefinite" nodeType="mainSeq">
-                <p:childTnLst>
-                  <p:par>
-                    <p:cTn id="3" fill="hold">
-                      <p:stCondLst>
-                        <p:cond delay="indefinite"/>
-                      </p:stCondLst>
-                      <p:childTnLst>
-                        <p:par>
-                          <p:cTn id="4" fill="hold">
-                            <p:stCondLst>
-                              <p:cond delay="0"/>
-                            </p:stCondLst>
-                            <p:childTnLst>
-                              <p:par>
-                                <p:cTn id="5" presetID="1" presetClass="entr" presetSubtype="0" fill="hold" grpId="0" nodeType="clickEffect">
-                                  <p:stCondLst>
-                                    <p:cond delay="0"/>
-                                  </p:stCondLst>
-                                  <p:childTnLst>
-                                    <p:set>
-                                      <p:cBhvr>
-                                        <p:cTn id="6" dur="1" fill="hold">
-                                          <p:stCondLst>
-                                            <p:cond delay="0"/>
-                                          </p:stCondLst>
-                                        </p:cTn>
-                                        <p:tgtEl>
-                                          <p:spTgt spid="4"/>
-                                        </p:tgtEl>
-                                        <p:attrNameLst>
-                                          <p:attrName>style.visibility</p:attrName>
-                                        </p:attrNameLst>
-                                      </p:cBhvr>
-                                      <p:to>
-                                        <p:strVal val="visible"/>
-                                      </p:to>
-                                    </p:set>
-                                  </p:childTnLst>
-                                </p:cTn>
-                              </p:par>
-                              <p:par>
-                                <p:cTn id="7" presetID="1" presetClass="entr" presetSubtype="0" fill="hold" nodeType="withEffect">
-                                  <p:stCondLst>
-                                    <p:cond delay="0"/>
-                                  </p:stCondLst>
-                                  <p:childTnLst>
-                                    <p:set>
-                                      <p:cBhvr>
-                                        <p:cTn id="8" dur="1" fill="hold">
-                                          <p:stCondLst>
-                                            <p:cond delay="0"/>
-                                          </p:stCondLst>
-                                        </p:cTn>
-                                        <p:tgtEl>
-                                          <p:spTgt spid="23"/>
-                                        </p:tgtEl>
-                                        <p:attrNameLst>
-                                          <p:attrName>style.visibility</p:attrName>
-                                        </p:attrNameLst>
-                                      </p:cBhvr>
-                                      <p:to>
-                                        <p:strVal val="visible"/>
-                                      </p:to>
-                                    </p:set>
-                                  </p:childTnLst>
-                                </p:cTn>
-                              </p:par>
-                              <p:par>
-                                <p:cTn id="9" presetID="1" presetClass="entr" presetSubtype="0" fill="hold" nodeType="withEffect">
-                                  <p:stCondLst>
-                                    <p:cond delay="0"/>
-                                  </p:stCondLst>
-                                  <p:childTnLst>
-                                    <p:set>
-                                      <p:cBhvr>
-                                        <p:cTn id="10" dur="1" fill="hold">
-                                          <p:stCondLst>
-                                            <p:cond delay="0"/>
-                                          </p:stCondLst>
-                                        </p:cTn>
-                                        <p:tgtEl>
-                                          <p:spTgt spid="31"/>
-                                        </p:tgtEl>
-                                        <p:attrNameLst>
-                                          <p:attrName>style.visibility</p:attrName>
-                                        </p:attrNameLst>
-                                      </p:cBhvr>
-                                      <p:to>
-                                        <p:strVal val="visible"/>
-                                      </p:to>
-                                    </p:set>
-                                  </p:childTnLst>
-                                </p:cTn>
-                              </p:par>
-                              <p:par>
-                                <p:cTn id="11" presetID="1" presetClass="entr" presetSubtype="0" fill="hold" nodeType="withEffect">
-                                  <p:stCondLst>
-                                    <p:cond delay="0"/>
-                                  </p:stCondLst>
-                                  <p:childTnLst>
-                                    <p:set>
-                                      <p:cBhvr>
-                                        <p:cTn id="12" dur="1" fill="hold">
-                                          <p:stCondLst>
-                                            <p:cond delay="0"/>
-                                          </p:stCondLst>
-                                        </p:cTn>
-                                        <p:tgtEl>
-                                          <p:spTgt spid="6"/>
-                                        </p:tgtEl>
-                                        <p:attrNameLst>
-                                          <p:attrName>style.visibility</p:attrName>
-                                        </p:attrNameLst>
-                                      </p:cBhvr>
-                                      <p:to>
-                                        <p:strVal val="visible"/>
-                                      </p:to>
-                                    </p:set>
-                                  </p:childTnLst>
-                                </p:cTn>
-                              </p:par>
-                              <p:par>
-                                <p:cTn id="13" presetID="1" presetClass="entr" presetSubtype="0" fill="hold" grpId="0" nodeType="withEffect">
-                                  <p:stCondLst>
-                                    <p:cond delay="0"/>
-                                  </p:stCondLst>
-                                  <p:childTnLst>
-                                    <p:set>
-                                      <p:cBhvr>
-                                        <p:cTn id="14" dur="1" fill="hold">
-                                          <p:stCondLst>
-                                            <p:cond delay="0"/>
-                                          </p:stCondLst>
-                                        </p:cTn>
-                                        <p:tgtEl>
-                                          <p:spTgt spid="33"/>
-                                        </p:tgtEl>
-                                        <p:attrNameLst>
-                                          <p:attrName>style.visibility</p:attrName>
-                                        </p:attrNameLst>
-                                      </p:cBhvr>
-                                      <p:to>
-                                        <p:strVal val="visible"/>
-                                      </p:to>
-                                    </p:set>
-                                  </p:childTnLst>
-                                </p:cTn>
-                              </p:par>
-                              <p:par>
-                                <p:cTn id="15" presetID="1" presetClass="entr" presetSubtype="0" fill="hold" nodeType="withEffect">
-                                  <p:stCondLst>
-                                    <p:cond delay="0"/>
-                                  </p:stCondLst>
-                                  <p:childTnLst>
-                                    <p:set>
-                                      <p:cBhvr>
-                                        <p:cTn id="16" dur="1" fill="hold">
-                                          <p:stCondLst>
-                                            <p:cond delay="0"/>
-                                          </p:stCondLst>
-                                        </p:cTn>
-                                        <p:tgtEl>
-                                          <p:spTgt spid="35"/>
-                                        </p:tgtEl>
-                                        <p:attrNameLst>
-                                          <p:attrName>style.visibility</p:attrName>
-                                        </p:attrNameLst>
-                                      </p:cBhvr>
-                                      <p:to>
-                                        <p:strVal val="visible"/>
-                                      </p:to>
-                                    </p:set>
-                                  </p:childTnLst>
-                                </p:cTn>
-                              </p:par>
-                              <p:par>
-                                <p:cTn id="17" presetID="1" presetClass="entr" presetSubtype="0" fill="hold" nodeType="withEffect">
-                                  <p:stCondLst>
-                                    <p:cond delay="0"/>
-                                  </p:stCondLst>
-                                  <p:childTnLst>
-                                    <p:set>
-                                      <p:cBhvr>
-                                        <p:cTn id="18" dur="1" fill="hold">
-                                          <p:stCondLst>
-                                            <p:cond delay="0"/>
-                                          </p:stCondLst>
-                                        </p:cTn>
-                                        <p:tgtEl>
-                                          <p:spTgt spid="37"/>
-                                        </p:tgtEl>
-                                        <p:attrNameLst>
-                                          <p:attrName>style.visibility</p:attrName>
-                                        </p:attrNameLst>
-                                      </p:cBhvr>
-                                      <p:to>
-                                        <p:strVal val="visible"/>
-                                      </p:to>
-                                    </p:set>
-                                  </p:childTnLst>
-                                </p:cTn>
-                              </p:par>
-                            </p:childTnLst>
-                          </p:cTn>
-                        </p:par>
-                      </p:childTnLst>
-                    </p:cTn>
-                  </p:par>
-                  <p:par>
-                    <p:cTn id="19" fill="hold">
-                      <p:stCondLst>
-                        <p:cond delay="indefinite"/>
-                      </p:stCondLst>
-                      <p:childTnLst>
-                        <p:par>
-                          <p:cTn id="20" fill="hold">
-                            <p:stCondLst>
-                              <p:cond delay="0"/>
-                            </p:stCondLst>
-                            <p:childTnLst>
-                              <p:par>
-                                <p:cTn id="21" presetID="1" presetClass="entr" presetSubtype="0" fill="hold" grpId="0" nodeType="clickEffect">
-                                  <p:stCondLst>
-                                    <p:cond delay="0"/>
-                                  </p:stCondLst>
-                                  <p:childTnLst>
-                                    <p:set>
-                                      <p:cBhvr>
-                                        <p:cTn id="22" dur="1" fill="hold">
-                                          <p:stCondLst>
-                                            <p:cond delay="0"/>
-                                          </p:stCondLst>
-                                        </p:cTn>
-                                        <p:tgtEl>
-                                          <p:spTgt spid="26"/>
-                                        </p:tgtEl>
-                                        <p:attrNameLst>
-                                          <p:attrName>style.visibility</p:attrName>
-                                        </p:attrNameLst>
-                                      </p:cBhvr>
-                                      <p:to>
-                                        <p:strVal val="visible"/>
-                                      </p:to>
-                                    </p:set>
-                                  </p:childTnLst>
-                                </p:cTn>
-                              </p:par>
-                            </p:childTnLst>
-                          </p:cTn>
-                        </p:par>
-                      </p:childTnLst>
-                    </p:cTn>
-                  </p:par>
-                </p:childTnLst>
-              </p:cTn>
-              <p:prevCondLst>
-                <p:cond evt="onPrev" delay="0">
-                  <p:tgtEl>
-                    <p:sldTgt/>
-                  </p:tgtEl>
-                </p:cond>
-              </p:prevCondLst>
-              <p:nextCondLst>
-                <p:cond evt="onNext" delay="0">
-                  <p:tgtEl>
-                    <p:sldTgt/>
-                  </p:tgtEl>
-                </p:cond>
-              </p:nextCondLst>
-            </p:seq>
-          </p:childTnLst>
-        </p:cTn>
-      </p:par>
-    </p:tnLst>
-    <p:bldLst>
-      <p:bldP spid="4" grpId="0"/>
-      <p:bldP spid="33" grpId="0"/>
-      <p:bldP spid="26" grpId="0"/>
-    </p:bldLst>
-  </p:timing>
 </p:sld>
 </file>
 
@@ -37374,6 +36392,1172 @@
 </file>
 
 <file path=ppt/slides/slide40.xml><?xml version="1.0" encoding="utf-8"?>
+<p:sld xmlns:a="http://schemas.openxmlformats.org/drawingml/2006/main" xmlns:r="http://schemas.openxmlformats.org/officeDocument/2006/relationships" xmlns:p="http://schemas.openxmlformats.org/presentationml/2006/main">
+  <p:cSld>
+    <p:spTree>
+      <p:nvGrpSpPr>
+        <p:cNvPr id="1" name=""/>
+        <p:cNvGrpSpPr/>
+        <p:nvPr/>
+      </p:nvGrpSpPr>
+      <p:grpSpPr>
+        <a:xfrm>
+          <a:off x="0" y="0"/>
+          <a:ext cx="0" cy="0"/>
+          <a:chOff x="0" y="0"/>
+          <a:chExt cx="0" cy="0"/>
+        </a:xfrm>
+      </p:grpSpPr>
+      <p:pic>
+        <p:nvPicPr>
+          <p:cNvPr id="2" name="Picture 1">
+            <a:extLst>
+              <a:ext uri="{FF2B5EF4-FFF2-40B4-BE49-F238E27FC236}">
+                <a16:creationId xmlns:a16="http://schemas.microsoft.com/office/drawing/2014/main" id="{BA4C119F-5576-3545-BA77-BF80E123D6E0}"/>
+              </a:ext>
+            </a:extLst>
+          </p:cNvPr>
+          <p:cNvPicPr>
+            <a:picLocks noChangeAspect="1"/>
+          </p:cNvPicPr>
+          <p:nvPr/>
+        </p:nvPicPr>
+        <p:blipFill>
+          <a:blip r:embed="rId2"/>
+          <a:stretch>
+            <a:fillRect/>
+          </a:stretch>
+        </p:blipFill>
+        <p:spPr>
+          <a:xfrm>
+            <a:off x="819150" y="330200"/>
+            <a:ext cx="7505700" cy="4483100"/>
+          </a:xfrm>
+          <a:prstGeom prst="rect">
+            <a:avLst/>
+          </a:prstGeom>
+        </p:spPr>
+      </p:pic>
+    </p:spTree>
+    <p:extLst>
+      <p:ext uri="{BB962C8B-B14F-4D97-AF65-F5344CB8AC3E}">
+        <p14:creationId xmlns:p14="http://schemas.microsoft.com/office/powerpoint/2010/main" val="3081577958"/>
+      </p:ext>
+    </p:extLst>
+  </p:cSld>
+  <p:clrMapOvr>
+    <a:masterClrMapping/>
+  </p:clrMapOvr>
+</p:sld>
+</file>
+
+<file path=ppt/slides/slide41.xml><?xml version="1.0" encoding="utf-8"?>
+<p:sld xmlns:a="http://schemas.openxmlformats.org/drawingml/2006/main" xmlns:r="http://schemas.openxmlformats.org/officeDocument/2006/relationships" xmlns:p="http://schemas.openxmlformats.org/presentationml/2006/main">
+  <p:cSld>
+    <p:spTree>
+      <p:nvGrpSpPr>
+        <p:cNvPr id="1" name=""/>
+        <p:cNvGrpSpPr/>
+        <p:nvPr/>
+      </p:nvGrpSpPr>
+      <p:grpSpPr>
+        <a:xfrm>
+          <a:off x="0" y="0"/>
+          <a:ext cx="0" cy="0"/>
+          <a:chOff x="0" y="0"/>
+          <a:chExt cx="0" cy="0"/>
+        </a:xfrm>
+      </p:grpSpPr>
+      <p:sp>
+        <p:nvSpPr>
+          <p:cNvPr id="8" name="TextBox 7"/>
+          <p:cNvSpPr txBox="1"/>
+          <p:nvPr/>
+        </p:nvSpPr>
+        <p:spPr>
+          <a:xfrm>
+            <a:off x="304800" y="1522907"/>
+            <a:ext cx="7314247" cy="461665"/>
+          </a:xfrm>
+          <a:prstGeom prst="rect">
+            <a:avLst/>
+          </a:prstGeom>
+          <a:noFill/>
+        </p:spPr>
+        <p:txBody>
+          <a:bodyPr wrap="square" rtlCol="0">
+            <a:spAutoFit/>
+          </a:bodyPr>
+          <a:lstStyle/>
+          <a:p>
+            <a:r>
+              <a:rPr lang="en-US" sz="2400" dirty="0"/>
+              <a:t>Intuition: If 1 parameter</a:t>
+            </a:r>
+          </a:p>
+        </p:txBody>
+      </p:sp>
+      <p:sp>
+        <p:nvSpPr>
+          <p:cNvPr id="4" name="Rectangle 3"/>
+          <p:cNvSpPr/>
+          <p:nvPr/>
+        </p:nvSpPr>
+        <p:spPr>
+          <a:xfrm>
+            <a:off x="304800" y="4481800"/>
+            <a:ext cx="2057400" cy="528350"/>
+          </a:xfrm>
+          <a:prstGeom prst="rect">
+            <a:avLst/>
+          </a:prstGeom>
+        </p:spPr>
+        <p:txBody>
+          <a:bodyPr wrap="square">
+            <a:spAutoFit/>
+          </a:bodyPr>
+          <a:lstStyle/>
+          <a:p>
+            <a:pPr>
+              <a:lnSpc>
+                <a:spcPts val="3360"/>
+              </a:lnSpc>
+            </a:pPr>
+            <a:r>
+              <a:rPr lang="en-US" sz="2400" dirty="0"/>
+              <a:t>Solve for </a:t>
+            </a:r>
+          </a:p>
+        </p:txBody>
+      </p:sp>
+      <p:pic>
+        <p:nvPicPr>
+          <p:cNvPr id="20" name="Picture 19"/>
+          <p:cNvPicPr>
+            <a:picLocks noChangeAspect="1"/>
+          </p:cNvPicPr>
+          <p:nvPr>
+            <p:custDataLst>
+              <p:tags r:id="rId1"/>
+            </p:custDataLst>
+          </p:nvPr>
+        </p:nvPicPr>
+        <p:blipFill>
+          <a:blip r:embed="rId11" cstate="print">
+            <a:extLst>
+              <a:ext uri="{28A0092B-C50C-407E-A947-70E740481C1C}">
+                <a14:useLocalDpi xmlns:a14="http://schemas.microsoft.com/office/drawing/2010/main" val="0"/>
+              </a:ext>
+            </a:extLst>
+          </a:blip>
+          <a:stretch>
+            <a:fillRect/>
+          </a:stretch>
+        </p:blipFill>
+        <p:spPr>
+          <a:xfrm>
+            <a:off x="838201" y="2090166"/>
+            <a:ext cx="2574036" cy="329184"/>
+          </a:xfrm>
+          <a:prstGeom prst="rect">
+            <a:avLst/>
+          </a:prstGeom>
+        </p:spPr>
+      </p:pic>
+      <p:cxnSp>
+        <p:nvCxnSpPr>
+          <p:cNvPr id="14" name="Straight Connector 13"/>
+          <p:cNvCxnSpPr/>
+          <p:nvPr/>
+        </p:nvCxnSpPr>
+        <p:spPr>
+          <a:xfrm flipV="1">
+            <a:off x="6011011" y="482104"/>
+            <a:ext cx="0" cy="1727136"/>
+          </a:xfrm>
+          <a:prstGeom prst="line">
+            <a:avLst/>
+          </a:prstGeom>
+          <a:ln w="38100">
+            <a:solidFill>
+              <a:schemeClr val="tx1"/>
+            </a:solidFill>
+            <a:tailEnd type="arrow" w="lg" len="med"/>
+          </a:ln>
+        </p:spPr>
+        <p:style>
+          <a:lnRef idx="1">
+            <a:schemeClr val="accent1"/>
+          </a:lnRef>
+          <a:fillRef idx="0">
+            <a:schemeClr val="accent1"/>
+          </a:fillRef>
+          <a:effectRef idx="0">
+            <a:schemeClr val="accent1"/>
+          </a:effectRef>
+          <a:fontRef idx="minor">
+            <a:schemeClr val="tx1"/>
+          </a:fontRef>
+        </p:style>
+      </p:cxnSp>
+      <p:cxnSp>
+        <p:nvCxnSpPr>
+          <p:cNvPr id="15" name="Straight Connector 14"/>
+          <p:cNvCxnSpPr/>
+          <p:nvPr/>
+        </p:nvCxnSpPr>
+        <p:spPr>
+          <a:xfrm>
+            <a:off x="5867400" y="2041755"/>
+            <a:ext cx="2164713" cy="0"/>
+          </a:xfrm>
+          <a:prstGeom prst="line">
+            <a:avLst/>
+          </a:prstGeom>
+          <a:ln w="38100">
+            <a:solidFill>
+              <a:schemeClr val="tx1"/>
+            </a:solidFill>
+            <a:tailEnd type="arrow" w="lg" len="med"/>
+          </a:ln>
+        </p:spPr>
+        <p:style>
+          <a:lnRef idx="1">
+            <a:schemeClr val="accent1"/>
+          </a:lnRef>
+          <a:fillRef idx="0">
+            <a:schemeClr val="accent1"/>
+          </a:fillRef>
+          <a:effectRef idx="0">
+            <a:schemeClr val="accent1"/>
+          </a:effectRef>
+          <a:fontRef idx="minor">
+            <a:schemeClr val="tx1"/>
+          </a:fontRef>
+        </p:style>
+      </p:cxnSp>
+      <p:pic>
+        <p:nvPicPr>
+          <p:cNvPr id="16" name="Picture 15"/>
+          <p:cNvPicPr>
+            <a:picLocks noChangeAspect="1"/>
+          </p:cNvPicPr>
+          <p:nvPr>
+            <p:custDataLst>
+              <p:tags r:id="rId2"/>
+            </p:custDataLst>
+          </p:nvPr>
+        </p:nvPicPr>
+        <p:blipFill>
+          <a:blip r:embed="rId12" cstate="print">
+            <a:extLst>
+              <a:ext uri="{28A0092B-C50C-407E-A947-70E740481C1C}">
+                <a14:useLocalDpi xmlns:a14="http://schemas.microsoft.com/office/drawing/2010/main" val="0"/>
+              </a:ext>
+            </a:extLst>
+          </a:blip>
+          <a:stretch>
+            <a:fillRect/>
+          </a:stretch>
+        </p:blipFill>
+        <p:spPr>
+          <a:xfrm>
+            <a:off x="6874431" y="2132867"/>
+            <a:ext cx="104411" cy="160784"/>
+          </a:xfrm>
+          <a:prstGeom prst="rect">
+            <a:avLst/>
+          </a:prstGeom>
+        </p:spPr>
+      </p:pic>
+      <p:pic>
+        <p:nvPicPr>
+          <p:cNvPr id="18" name="Picture 17"/>
+          <p:cNvPicPr>
+            <a:picLocks noChangeAspect="1"/>
+          </p:cNvPicPr>
+          <p:nvPr>
+            <p:custDataLst>
+              <p:tags r:id="rId3"/>
+            </p:custDataLst>
+          </p:nvPr>
+        </p:nvPicPr>
+        <p:blipFill>
+          <a:blip r:embed="rId13" cstate="print">
+            <a:extLst>
+              <a:ext uri="{28A0092B-C50C-407E-A947-70E740481C1C}">
+                <a14:useLocalDpi xmlns:a14="http://schemas.microsoft.com/office/drawing/2010/main" val="0"/>
+              </a:ext>
+            </a:extLst>
+          </a:blip>
+          <a:stretch>
+            <a:fillRect/>
+          </a:stretch>
+        </p:blipFill>
+        <p:spPr>
+          <a:xfrm>
+            <a:off x="7813968" y="869374"/>
+            <a:ext cx="436290" cy="224427"/>
+          </a:xfrm>
+          <a:prstGeom prst="rect">
+            <a:avLst/>
+          </a:prstGeom>
+        </p:spPr>
+      </p:pic>
+      <p:cxnSp>
+        <p:nvCxnSpPr>
+          <p:cNvPr id="23" name="Straight Connector 22"/>
+          <p:cNvCxnSpPr/>
+          <p:nvPr/>
+        </p:nvCxnSpPr>
+        <p:spPr>
+          <a:xfrm>
+            <a:off x="381000" y="2876550"/>
+            <a:ext cx="8305800" cy="0"/>
+          </a:xfrm>
+          <a:prstGeom prst="line">
+            <a:avLst/>
+          </a:prstGeom>
+        </p:spPr>
+        <p:style>
+          <a:lnRef idx="1">
+            <a:schemeClr val="dk1"/>
+          </a:lnRef>
+          <a:fillRef idx="0">
+            <a:schemeClr val="dk1"/>
+          </a:fillRef>
+          <a:effectRef idx="0">
+            <a:schemeClr val="dk1"/>
+          </a:effectRef>
+          <a:fontRef idx="minor">
+            <a:schemeClr val="tx1"/>
+          </a:fontRef>
+        </p:style>
+      </p:cxnSp>
+      <p:pic>
+        <p:nvPicPr>
+          <p:cNvPr id="31" name="Picture 30"/>
+          <p:cNvPicPr>
+            <a:picLocks noChangeAspect="1"/>
+          </p:cNvPicPr>
+          <p:nvPr>
+            <p:custDataLst>
+              <p:tags r:id="rId4"/>
+            </p:custDataLst>
+          </p:nvPr>
+        </p:nvPicPr>
+        <p:blipFill>
+          <a:blip r:embed="rId14" cstate="print">
+            <a:extLst>
+              <a:ext uri="{28A0092B-C50C-407E-A947-70E740481C1C}">
+                <a14:useLocalDpi xmlns:a14="http://schemas.microsoft.com/office/drawing/2010/main" val="0"/>
+              </a:ext>
+            </a:extLst>
+          </a:blip>
+          <a:stretch>
+            <a:fillRect/>
+          </a:stretch>
+        </p:blipFill>
+        <p:spPr>
+          <a:xfrm>
+            <a:off x="2438400" y="3001385"/>
+            <a:ext cx="5719572" cy="832104"/>
+          </a:xfrm>
+          <a:prstGeom prst="rect">
+            <a:avLst/>
+          </a:prstGeom>
+        </p:spPr>
+      </p:pic>
+      <p:pic>
+        <p:nvPicPr>
+          <p:cNvPr id="6" name="Picture 5"/>
+          <p:cNvPicPr>
+            <a:picLocks noChangeAspect="1"/>
+          </p:cNvPicPr>
+          <p:nvPr>
+            <p:custDataLst>
+              <p:tags r:id="rId5"/>
+            </p:custDataLst>
+          </p:nvPr>
+        </p:nvPicPr>
+        <p:blipFill>
+          <a:blip r:embed="rId15" cstate="print">
+            <a:extLst>
+              <a:ext uri="{28A0092B-C50C-407E-A947-70E740481C1C}">
+                <a14:useLocalDpi xmlns:a14="http://schemas.microsoft.com/office/drawing/2010/main" val="0"/>
+              </a:ext>
+            </a:extLst>
+          </a:blip>
+          <a:stretch>
+            <a:fillRect/>
+          </a:stretch>
+        </p:blipFill>
+        <p:spPr>
+          <a:xfrm>
+            <a:off x="1042416" y="3947587"/>
+            <a:ext cx="2299716" cy="436626"/>
+          </a:xfrm>
+          <a:prstGeom prst="rect">
+            <a:avLst/>
+          </a:prstGeom>
+        </p:spPr>
+      </p:pic>
+      <p:sp>
+        <p:nvSpPr>
+          <p:cNvPr id="33" name="Rectangle 32"/>
+          <p:cNvSpPr/>
+          <p:nvPr/>
+        </p:nvSpPr>
+        <p:spPr>
+          <a:xfrm>
+            <a:off x="3679751" y="3833489"/>
+            <a:ext cx="3336036" cy="500586"/>
+          </a:xfrm>
+          <a:prstGeom prst="rect">
+            <a:avLst/>
+          </a:prstGeom>
+        </p:spPr>
+        <p:txBody>
+          <a:bodyPr wrap="square">
+            <a:spAutoFit/>
+          </a:bodyPr>
+          <a:lstStyle/>
+          <a:p>
+            <a:pPr>
+              <a:lnSpc>
+                <a:spcPts val="3360"/>
+              </a:lnSpc>
+            </a:pPr>
+            <a:r>
+              <a:rPr lang="en-US" sz="2400" dirty="0"/>
+              <a:t>(for every   )</a:t>
+            </a:r>
+          </a:p>
+        </p:txBody>
+      </p:sp>
+      <p:pic>
+        <p:nvPicPr>
+          <p:cNvPr id="35" name="Picture 34"/>
+          <p:cNvPicPr>
+            <a:picLocks noChangeAspect="1"/>
+          </p:cNvPicPr>
+          <p:nvPr>
+            <p:custDataLst>
+              <p:tags r:id="rId6"/>
+            </p:custDataLst>
+          </p:nvPr>
+        </p:nvPicPr>
+        <p:blipFill>
+          <a:blip r:embed="rId16" cstate="print">
+            <a:extLst>
+              <a:ext uri="{28A0092B-C50C-407E-A947-70E740481C1C}">
+                <a14:useLocalDpi xmlns:a14="http://schemas.microsoft.com/office/drawing/2010/main" val="0"/>
+              </a:ext>
+            </a:extLst>
+          </a:blip>
+          <a:stretch>
+            <a:fillRect/>
+          </a:stretch>
+        </p:blipFill>
+        <p:spPr>
+          <a:xfrm>
+            <a:off x="5038165" y="4012135"/>
+            <a:ext cx="125730" cy="262890"/>
+          </a:xfrm>
+          <a:prstGeom prst="rect">
+            <a:avLst/>
+          </a:prstGeom>
+        </p:spPr>
+      </p:pic>
+      <p:pic>
+        <p:nvPicPr>
+          <p:cNvPr id="37" name="Picture 36"/>
+          <p:cNvPicPr>
+            <a:picLocks noChangeAspect="1"/>
+          </p:cNvPicPr>
+          <p:nvPr>
+            <p:custDataLst>
+              <p:tags r:id="rId7"/>
+            </p:custDataLst>
+          </p:nvPr>
+        </p:nvPicPr>
+        <p:blipFill>
+          <a:blip r:embed="rId17" cstate="print">
+            <a:extLst>
+              <a:ext uri="{28A0092B-C50C-407E-A947-70E740481C1C}">
+                <a14:useLocalDpi xmlns:a14="http://schemas.microsoft.com/office/drawing/2010/main" val="0"/>
+              </a:ext>
+            </a:extLst>
+          </a:blip>
+          <a:stretch>
+            <a:fillRect/>
+          </a:stretch>
+        </p:blipFill>
+        <p:spPr>
+          <a:xfrm>
+            <a:off x="1618869" y="4634567"/>
+            <a:ext cx="1639062" cy="276606"/>
+          </a:xfrm>
+          <a:prstGeom prst="rect">
+            <a:avLst/>
+          </a:prstGeom>
+        </p:spPr>
+      </p:pic>
+      <p:grpSp>
+        <p:nvGrpSpPr>
+          <p:cNvPr id="2" name="Group 1"/>
+          <p:cNvGrpSpPr/>
+          <p:nvPr/>
+        </p:nvGrpSpPr>
+        <p:grpSpPr>
+          <a:xfrm>
+            <a:off x="6172200" y="833140"/>
+            <a:ext cx="1524880" cy="1052810"/>
+            <a:chOff x="5137487" y="1006891"/>
+            <a:chExt cx="2015567" cy="1391591"/>
+          </a:xfrm>
+        </p:grpSpPr>
+        <p:sp>
+          <p:nvSpPr>
+            <p:cNvPr id="22" name="Freeform 21"/>
+            <p:cNvSpPr/>
+            <p:nvPr/>
+          </p:nvSpPr>
+          <p:spPr>
+            <a:xfrm>
+              <a:off x="5137487" y="1007182"/>
+              <a:ext cx="1041121" cy="1391300"/>
+            </a:xfrm>
+            <a:custGeom>
+              <a:avLst/>
+              <a:gdLst>
+                <a:gd name="connsiteX0" fmla="*/ 0 w 2667000"/>
+                <a:gd name="connsiteY0" fmla="*/ 0 h 2076450"/>
+                <a:gd name="connsiteX1" fmla="*/ 800100 w 2667000"/>
+                <a:gd name="connsiteY1" fmla="*/ 1724025 h 2076450"/>
+                <a:gd name="connsiteX2" fmla="*/ 2667000 w 2667000"/>
+                <a:gd name="connsiteY2" fmla="*/ 2076450 h 2076450"/>
+                <a:gd name="connsiteX0" fmla="*/ 0 w 1819275"/>
+                <a:gd name="connsiteY0" fmla="*/ 0 h 2085975"/>
+                <a:gd name="connsiteX1" fmla="*/ 800100 w 1819275"/>
+                <a:gd name="connsiteY1" fmla="*/ 1724025 h 2085975"/>
+                <a:gd name="connsiteX2" fmla="*/ 1819275 w 1819275"/>
+                <a:gd name="connsiteY2" fmla="*/ 2085975 h 2085975"/>
+                <a:gd name="connsiteX0" fmla="*/ 0 w 1819275"/>
+                <a:gd name="connsiteY0" fmla="*/ 0 h 2085975"/>
+                <a:gd name="connsiteX1" fmla="*/ 609600 w 1819275"/>
+                <a:gd name="connsiteY1" fmla="*/ 1504950 h 2085975"/>
+                <a:gd name="connsiteX2" fmla="*/ 1819275 w 1819275"/>
+                <a:gd name="connsiteY2" fmla="*/ 2085975 h 2085975"/>
+                <a:gd name="connsiteX0" fmla="*/ 0 w 1819275"/>
+                <a:gd name="connsiteY0" fmla="*/ 0 h 2085975"/>
+                <a:gd name="connsiteX1" fmla="*/ 609600 w 1819275"/>
+                <a:gd name="connsiteY1" fmla="*/ 1504950 h 2085975"/>
+                <a:gd name="connsiteX2" fmla="*/ 1819275 w 1819275"/>
+                <a:gd name="connsiteY2" fmla="*/ 2085975 h 2085975"/>
+                <a:gd name="connsiteX0" fmla="*/ 0 w 1819275"/>
+                <a:gd name="connsiteY0" fmla="*/ 0 h 2087456"/>
+                <a:gd name="connsiteX1" fmla="*/ 609600 w 1819275"/>
+                <a:gd name="connsiteY1" fmla="*/ 1504950 h 2087456"/>
+                <a:gd name="connsiteX2" fmla="*/ 1819275 w 1819275"/>
+                <a:gd name="connsiteY2" fmla="*/ 2085975 h 2087456"/>
+                <a:gd name="connsiteX0" fmla="*/ 0 w 1590675"/>
+                <a:gd name="connsiteY0" fmla="*/ 0 h 2124809"/>
+                <a:gd name="connsiteX1" fmla="*/ 381000 w 1590675"/>
+                <a:gd name="connsiteY1" fmla="*/ 1543050 h 2124809"/>
+                <a:gd name="connsiteX2" fmla="*/ 1590675 w 1590675"/>
+                <a:gd name="connsiteY2" fmla="*/ 2124075 h 2124809"/>
+                <a:gd name="connsiteX0" fmla="*/ 2321 w 1592996"/>
+                <a:gd name="connsiteY0" fmla="*/ 0 h 2124809"/>
+                <a:gd name="connsiteX1" fmla="*/ 383321 w 1592996"/>
+                <a:gd name="connsiteY1" fmla="*/ 1543050 h 2124809"/>
+                <a:gd name="connsiteX2" fmla="*/ 1592996 w 1592996"/>
+                <a:gd name="connsiteY2" fmla="*/ 2124075 h 2124809"/>
+                <a:gd name="connsiteX0" fmla="*/ 0 w 1590675"/>
+                <a:gd name="connsiteY0" fmla="*/ 0 h 2124809"/>
+                <a:gd name="connsiteX1" fmla="*/ 381000 w 1590675"/>
+                <a:gd name="connsiteY1" fmla="*/ 1543050 h 2124809"/>
+                <a:gd name="connsiteX2" fmla="*/ 1590675 w 1590675"/>
+                <a:gd name="connsiteY2" fmla="*/ 2124075 h 2124809"/>
+                <a:gd name="connsiteX0" fmla="*/ 0 w 1590675"/>
+                <a:gd name="connsiteY0" fmla="*/ 0 h 2124675"/>
+                <a:gd name="connsiteX1" fmla="*/ 468316 w 1590675"/>
+                <a:gd name="connsiteY1" fmla="*/ 1484839 h 2124675"/>
+                <a:gd name="connsiteX2" fmla="*/ 1590675 w 1590675"/>
+                <a:gd name="connsiteY2" fmla="*/ 2124075 h 2124675"/>
+                <a:gd name="connsiteX0" fmla="*/ 0 w 1590675"/>
+                <a:gd name="connsiteY0" fmla="*/ 0 h 2125697"/>
+                <a:gd name="connsiteX1" fmla="*/ 555633 w 1590675"/>
+                <a:gd name="connsiteY1" fmla="*/ 1688578 h 2125697"/>
+                <a:gd name="connsiteX2" fmla="*/ 1590675 w 1590675"/>
+                <a:gd name="connsiteY2" fmla="*/ 2124075 h 2125697"/>
+              </a:gdLst>
+              <a:ahLst/>
+              <a:cxnLst>
+                <a:cxn ang="0">
+                  <a:pos x="connsiteX0" y="connsiteY0"/>
+                </a:cxn>
+                <a:cxn ang="0">
+                  <a:pos x="connsiteX1" y="connsiteY1"/>
+                </a:cxn>
+                <a:cxn ang="0">
+                  <a:pos x="connsiteX2" y="connsiteY2"/>
+                </a:cxn>
+              </a:cxnLst>
+              <a:rect l="l" t="t" r="r" b="b"/>
+              <a:pathLst>
+                <a:path w="1590675" h="2125697">
+                  <a:moveTo>
+                    <a:pt x="0" y="0"/>
+                  </a:moveTo>
+                  <a:cubicBezTo>
+                    <a:pt x="25400" y="917575"/>
+                    <a:pt x="290521" y="1334566"/>
+                    <a:pt x="555633" y="1688578"/>
+                  </a:cubicBezTo>
+                  <a:cubicBezTo>
+                    <a:pt x="820745" y="2042590"/>
+                    <a:pt x="1250950" y="2139950"/>
+                    <a:pt x="1590675" y="2124075"/>
+                  </a:cubicBezTo>
+                </a:path>
+              </a:pathLst>
+            </a:custGeom>
+            <a:noFill/>
+          </p:spPr>
+          <p:style>
+            <a:lnRef idx="2">
+              <a:schemeClr val="accent1">
+                <a:shade val="50000"/>
+              </a:schemeClr>
+            </a:lnRef>
+            <a:fillRef idx="1">
+              <a:schemeClr val="accent1"/>
+            </a:fillRef>
+            <a:effectRef idx="0">
+              <a:schemeClr val="accent1"/>
+            </a:effectRef>
+            <a:fontRef idx="minor">
+              <a:schemeClr val="lt1"/>
+            </a:fontRef>
+          </p:style>
+          <p:txBody>
+            <a:bodyPr rtlCol="0" anchor="ctr"/>
+            <a:lstStyle/>
+            <a:p>
+              <a:pPr algn="ctr"/>
+              <a:endParaRPr lang="en-US"/>
+            </a:p>
+          </p:txBody>
+        </p:sp>
+        <p:sp>
+          <p:nvSpPr>
+            <p:cNvPr id="24" name="Freeform 23"/>
+            <p:cNvSpPr/>
+            <p:nvPr/>
+          </p:nvSpPr>
+          <p:spPr>
+            <a:xfrm flipH="1">
+              <a:off x="6111933" y="1006891"/>
+              <a:ext cx="1041121" cy="1391300"/>
+            </a:xfrm>
+            <a:custGeom>
+              <a:avLst/>
+              <a:gdLst>
+                <a:gd name="connsiteX0" fmla="*/ 0 w 2667000"/>
+                <a:gd name="connsiteY0" fmla="*/ 0 h 2076450"/>
+                <a:gd name="connsiteX1" fmla="*/ 800100 w 2667000"/>
+                <a:gd name="connsiteY1" fmla="*/ 1724025 h 2076450"/>
+                <a:gd name="connsiteX2" fmla="*/ 2667000 w 2667000"/>
+                <a:gd name="connsiteY2" fmla="*/ 2076450 h 2076450"/>
+                <a:gd name="connsiteX0" fmla="*/ 0 w 1819275"/>
+                <a:gd name="connsiteY0" fmla="*/ 0 h 2085975"/>
+                <a:gd name="connsiteX1" fmla="*/ 800100 w 1819275"/>
+                <a:gd name="connsiteY1" fmla="*/ 1724025 h 2085975"/>
+                <a:gd name="connsiteX2" fmla="*/ 1819275 w 1819275"/>
+                <a:gd name="connsiteY2" fmla="*/ 2085975 h 2085975"/>
+                <a:gd name="connsiteX0" fmla="*/ 0 w 1819275"/>
+                <a:gd name="connsiteY0" fmla="*/ 0 h 2085975"/>
+                <a:gd name="connsiteX1" fmla="*/ 609600 w 1819275"/>
+                <a:gd name="connsiteY1" fmla="*/ 1504950 h 2085975"/>
+                <a:gd name="connsiteX2" fmla="*/ 1819275 w 1819275"/>
+                <a:gd name="connsiteY2" fmla="*/ 2085975 h 2085975"/>
+                <a:gd name="connsiteX0" fmla="*/ 0 w 1819275"/>
+                <a:gd name="connsiteY0" fmla="*/ 0 h 2085975"/>
+                <a:gd name="connsiteX1" fmla="*/ 609600 w 1819275"/>
+                <a:gd name="connsiteY1" fmla="*/ 1504950 h 2085975"/>
+                <a:gd name="connsiteX2" fmla="*/ 1819275 w 1819275"/>
+                <a:gd name="connsiteY2" fmla="*/ 2085975 h 2085975"/>
+                <a:gd name="connsiteX0" fmla="*/ 0 w 1819275"/>
+                <a:gd name="connsiteY0" fmla="*/ 0 h 2087456"/>
+                <a:gd name="connsiteX1" fmla="*/ 609600 w 1819275"/>
+                <a:gd name="connsiteY1" fmla="*/ 1504950 h 2087456"/>
+                <a:gd name="connsiteX2" fmla="*/ 1819275 w 1819275"/>
+                <a:gd name="connsiteY2" fmla="*/ 2085975 h 2087456"/>
+                <a:gd name="connsiteX0" fmla="*/ 0 w 1590675"/>
+                <a:gd name="connsiteY0" fmla="*/ 0 h 2124809"/>
+                <a:gd name="connsiteX1" fmla="*/ 381000 w 1590675"/>
+                <a:gd name="connsiteY1" fmla="*/ 1543050 h 2124809"/>
+                <a:gd name="connsiteX2" fmla="*/ 1590675 w 1590675"/>
+                <a:gd name="connsiteY2" fmla="*/ 2124075 h 2124809"/>
+                <a:gd name="connsiteX0" fmla="*/ 2321 w 1592996"/>
+                <a:gd name="connsiteY0" fmla="*/ 0 h 2124809"/>
+                <a:gd name="connsiteX1" fmla="*/ 383321 w 1592996"/>
+                <a:gd name="connsiteY1" fmla="*/ 1543050 h 2124809"/>
+                <a:gd name="connsiteX2" fmla="*/ 1592996 w 1592996"/>
+                <a:gd name="connsiteY2" fmla="*/ 2124075 h 2124809"/>
+                <a:gd name="connsiteX0" fmla="*/ 0 w 1590675"/>
+                <a:gd name="connsiteY0" fmla="*/ 0 h 2124809"/>
+                <a:gd name="connsiteX1" fmla="*/ 381000 w 1590675"/>
+                <a:gd name="connsiteY1" fmla="*/ 1543050 h 2124809"/>
+                <a:gd name="connsiteX2" fmla="*/ 1590675 w 1590675"/>
+                <a:gd name="connsiteY2" fmla="*/ 2124075 h 2124809"/>
+                <a:gd name="connsiteX0" fmla="*/ 0 w 1590675"/>
+                <a:gd name="connsiteY0" fmla="*/ 0 h 2124675"/>
+                <a:gd name="connsiteX1" fmla="*/ 468316 w 1590675"/>
+                <a:gd name="connsiteY1" fmla="*/ 1484839 h 2124675"/>
+                <a:gd name="connsiteX2" fmla="*/ 1590675 w 1590675"/>
+                <a:gd name="connsiteY2" fmla="*/ 2124075 h 2124675"/>
+                <a:gd name="connsiteX0" fmla="*/ 0 w 1590675"/>
+                <a:gd name="connsiteY0" fmla="*/ 0 h 2125697"/>
+                <a:gd name="connsiteX1" fmla="*/ 555633 w 1590675"/>
+                <a:gd name="connsiteY1" fmla="*/ 1688578 h 2125697"/>
+                <a:gd name="connsiteX2" fmla="*/ 1590675 w 1590675"/>
+                <a:gd name="connsiteY2" fmla="*/ 2124075 h 2125697"/>
+              </a:gdLst>
+              <a:ahLst/>
+              <a:cxnLst>
+                <a:cxn ang="0">
+                  <a:pos x="connsiteX0" y="connsiteY0"/>
+                </a:cxn>
+                <a:cxn ang="0">
+                  <a:pos x="connsiteX1" y="connsiteY1"/>
+                </a:cxn>
+                <a:cxn ang="0">
+                  <a:pos x="connsiteX2" y="connsiteY2"/>
+                </a:cxn>
+              </a:cxnLst>
+              <a:rect l="l" t="t" r="r" b="b"/>
+              <a:pathLst>
+                <a:path w="1590675" h="2125697">
+                  <a:moveTo>
+                    <a:pt x="0" y="0"/>
+                  </a:moveTo>
+                  <a:cubicBezTo>
+                    <a:pt x="25400" y="917575"/>
+                    <a:pt x="290521" y="1334566"/>
+                    <a:pt x="555633" y="1688578"/>
+                  </a:cubicBezTo>
+                  <a:cubicBezTo>
+                    <a:pt x="820745" y="2042590"/>
+                    <a:pt x="1250950" y="2139950"/>
+                    <a:pt x="1590675" y="2124075"/>
+                  </a:cubicBezTo>
+                </a:path>
+              </a:pathLst>
+            </a:custGeom>
+            <a:noFill/>
+          </p:spPr>
+          <p:style>
+            <a:lnRef idx="2">
+              <a:schemeClr val="accent1">
+                <a:shade val="50000"/>
+              </a:schemeClr>
+            </a:lnRef>
+            <a:fillRef idx="1">
+              <a:schemeClr val="accent1"/>
+            </a:fillRef>
+            <a:effectRef idx="0">
+              <a:schemeClr val="accent1"/>
+            </a:effectRef>
+            <a:fontRef idx="minor">
+              <a:schemeClr val="lt1"/>
+            </a:fontRef>
+          </p:style>
+          <p:txBody>
+            <a:bodyPr rtlCol="0" anchor="ctr"/>
+            <a:lstStyle/>
+            <a:p>
+              <a:pPr algn="ctr"/>
+              <a:endParaRPr lang="en-US"/>
+            </a:p>
+          </p:txBody>
+        </p:sp>
+      </p:grpSp>
+      <p:sp>
+        <p:nvSpPr>
+          <p:cNvPr id="26" name="TextBox 25"/>
+          <p:cNvSpPr txBox="1"/>
+          <p:nvPr/>
+        </p:nvSpPr>
+        <p:spPr>
+          <a:xfrm>
+            <a:off x="304800" y="285750"/>
+            <a:ext cx="7314247" cy="830997"/>
+          </a:xfrm>
+          <a:prstGeom prst="rect">
+            <a:avLst/>
+          </a:prstGeom>
+          <a:noFill/>
+        </p:spPr>
+        <p:txBody>
+          <a:bodyPr wrap="square" rtlCol="0">
+            <a:spAutoFit/>
+          </a:bodyPr>
+          <a:lstStyle/>
+          <a:p>
+            <a:r>
+              <a:rPr lang="en-US" sz="2400" b="1" dirty="0"/>
+              <a:t>Normal equation</a:t>
+            </a:r>
+            <a:r>
+              <a:rPr lang="en-US" sz="2400" dirty="0"/>
+              <a:t>: </a:t>
+            </a:r>
+          </a:p>
+          <a:p>
+            <a:r>
+              <a:rPr lang="en-US" sz="2400" dirty="0"/>
+              <a:t>Method to solve for analytically.</a:t>
+            </a:r>
+          </a:p>
+        </p:txBody>
+      </p:sp>
+      <p:pic>
+        <p:nvPicPr>
+          <p:cNvPr id="27" name="Picture 26"/>
+          <p:cNvPicPr>
+            <a:picLocks noChangeAspect="1"/>
+          </p:cNvPicPr>
+          <p:nvPr>
+            <p:custDataLst>
+              <p:tags r:id="rId8"/>
+            </p:custDataLst>
+          </p:nvPr>
+        </p:nvPicPr>
+        <p:blipFill>
+          <a:blip r:embed="rId18" cstate="print">
+            <a:extLst>
+              <a:ext uri="{28A0092B-C50C-407E-A947-70E740481C1C}">
+                <a14:useLocalDpi xmlns:a14="http://schemas.microsoft.com/office/drawing/2010/main" val="0"/>
+              </a:ext>
+            </a:extLst>
+          </a:blip>
+          <a:stretch>
+            <a:fillRect/>
+          </a:stretch>
+        </p:blipFill>
+        <p:spPr>
+          <a:xfrm>
+            <a:off x="533400" y="3257550"/>
+            <a:ext cx="918972" cy="306324"/>
+          </a:xfrm>
+          <a:prstGeom prst="rect">
+            <a:avLst/>
+          </a:prstGeom>
+        </p:spPr>
+      </p:pic>
+    </p:spTree>
+    <p:extLst>
+      <p:ext uri="{BB962C8B-B14F-4D97-AF65-F5344CB8AC3E}">
+        <p14:creationId xmlns:p14="http://schemas.microsoft.com/office/powerpoint/2010/main" val="3694999254"/>
+      </p:ext>
+    </p:extLst>
+  </p:cSld>
+  <p:clrMapOvr>
+    <a:masterClrMapping/>
+  </p:clrMapOvr>
+  <p:timing>
+    <p:tnLst>
+      <p:par>
+        <p:cTn id="1" dur="indefinite" restart="never" nodeType="tmRoot">
+          <p:childTnLst>
+            <p:seq concurrent="1" nextAc="seek">
+              <p:cTn id="2" dur="indefinite" nodeType="mainSeq">
+                <p:childTnLst>
+                  <p:par>
+                    <p:cTn id="3" fill="hold">
+                      <p:stCondLst>
+                        <p:cond delay="indefinite"/>
+                      </p:stCondLst>
+                      <p:childTnLst>
+                        <p:par>
+                          <p:cTn id="4" fill="hold">
+                            <p:stCondLst>
+                              <p:cond delay="0"/>
+                            </p:stCondLst>
+                            <p:childTnLst>
+                              <p:par>
+                                <p:cTn id="5" presetID="1" presetClass="entr" presetSubtype="0" fill="hold" grpId="0" nodeType="clickEffect">
+                                  <p:stCondLst>
+                                    <p:cond delay="0"/>
+                                  </p:stCondLst>
+                                  <p:childTnLst>
+                                    <p:set>
+                                      <p:cBhvr>
+                                        <p:cTn id="6" dur="1" fill="hold">
+                                          <p:stCondLst>
+                                            <p:cond delay="0"/>
+                                          </p:stCondLst>
+                                        </p:cTn>
+                                        <p:tgtEl>
+                                          <p:spTgt spid="4"/>
+                                        </p:tgtEl>
+                                        <p:attrNameLst>
+                                          <p:attrName>style.visibility</p:attrName>
+                                        </p:attrNameLst>
+                                      </p:cBhvr>
+                                      <p:to>
+                                        <p:strVal val="visible"/>
+                                      </p:to>
+                                    </p:set>
+                                  </p:childTnLst>
+                                </p:cTn>
+                              </p:par>
+                              <p:par>
+                                <p:cTn id="7" presetID="1" presetClass="entr" presetSubtype="0" fill="hold" nodeType="withEffect">
+                                  <p:stCondLst>
+                                    <p:cond delay="0"/>
+                                  </p:stCondLst>
+                                  <p:childTnLst>
+                                    <p:set>
+                                      <p:cBhvr>
+                                        <p:cTn id="8" dur="1" fill="hold">
+                                          <p:stCondLst>
+                                            <p:cond delay="0"/>
+                                          </p:stCondLst>
+                                        </p:cTn>
+                                        <p:tgtEl>
+                                          <p:spTgt spid="23"/>
+                                        </p:tgtEl>
+                                        <p:attrNameLst>
+                                          <p:attrName>style.visibility</p:attrName>
+                                        </p:attrNameLst>
+                                      </p:cBhvr>
+                                      <p:to>
+                                        <p:strVal val="visible"/>
+                                      </p:to>
+                                    </p:set>
+                                  </p:childTnLst>
+                                </p:cTn>
+                              </p:par>
+                              <p:par>
+                                <p:cTn id="9" presetID="1" presetClass="entr" presetSubtype="0" fill="hold" nodeType="withEffect">
+                                  <p:stCondLst>
+                                    <p:cond delay="0"/>
+                                  </p:stCondLst>
+                                  <p:childTnLst>
+                                    <p:set>
+                                      <p:cBhvr>
+                                        <p:cTn id="10" dur="1" fill="hold">
+                                          <p:stCondLst>
+                                            <p:cond delay="0"/>
+                                          </p:stCondLst>
+                                        </p:cTn>
+                                        <p:tgtEl>
+                                          <p:spTgt spid="31"/>
+                                        </p:tgtEl>
+                                        <p:attrNameLst>
+                                          <p:attrName>style.visibility</p:attrName>
+                                        </p:attrNameLst>
+                                      </p:cBhvr>
+                                      <p:to>
+                                        <p:strVal val="visible"/>
+                                      </p:to>
+                                    </p:set>
+                                  </p:childTnLst>
+                                </p:cTn>
+                              </p:par>
+                              <p:par>
+                                <p:cTn id="11" presetID="1" presetClass="entr" presetSubtype="0" fill="hold" nodeType="withEffect">
+                                  <p:stCondLst>
+                                    <p:cond delay="0"/>
+                                  </p:stCondLst>
+                                  <p:childTnLst>
+                                    <p:set>
+                                      <p:cBhvr>
+                                        <p:cTn id="12" dur="1" fill="hold">
+                                          <p:stCondLst>
+                                            <p:cond delay="0"/>
+                                          </p:stCondLst>
+                                        </p:cTn>
+                                        <p:tgtEl>
+                                          <p:spTgt spid="6"/>
+                                        </p:tgtEl>
+                                        <p:attrNameLst>
+                                          <p:attrName>style.visibility</p:attrName>
+                                        </p:attrNameLst>
+                                      </p:cBhvr>
+                                      <p:to>
+                                        <p:strVal val="visible"/>
+                                      </p:to>
+                                    </p:set>
+                                  </p:childTnLst>
+                                </p:cTn>
+                              </p:par>
+                              <p:par>
+                                <p:cTn id="13" presetID="1" presetClass="entr" presetSubtype="0" fill="hold" grpId="0" nodeType="withEffect">
+                                  <p:stCondLst>
+                                    <p:cond delay="0"/>
+                                  </p:stCondLst>
+                                  <p:childTnLst>
+                                    <p:set>
+                                      <p:cBhvr>
+                                        <p:cTn id="14" dur="1" fill="hold">
+                                          <p:stCondLst>
+                                            <p:cond delay="0"/>
+                                          </p:stCondLst>
+                                        </p:cTn>
+                                        <p:tgtEl>
+                                          <p:spTgt spid="33"/>
+                                        </p:tgtEl>
+                                        <p:attrNameLst>
+                                          <p:attrName>style.visibility</p:attrName>
+                                        </p:attrNameLst>
+                                      </p:cBhvr>
+                                      <p:to>
+                                        <p:strVal val="visible"/>
+                                      </p:to>
+                                    </p:set>
+                                  </p:childTnLst>
+                                </p:cTn>
+                              </p:par>
+                              <p:par>
+                                <p:cTn id="15" presetID="1" presetClass="entr" presetSubtype="0" fill="hold" nodeType="withEffect">
+                                  <p:stCondLst>
+                                    <p:cond delay="0"/>
+                                  </p:stCondLst>
+                                  <p:childTnLst>
+                                    <p:set>
+                                      <p:cBhvr>
+                                        <p:cTn id="16" dur="1" fill="hold">
+                                          <p:stCondLst>
+                                            <p:cond delay="0"/>
+                                          </p:stCondLst>
+                                        </p:cTn>
+                                        <p:tgtEl>
+                                          <p:spTgt spid="35"/>
+                                        </p:tgtEl>
+                                        <p:attrNameLst>
+                                          <p:attrName>style.visibility</p:attrName>
+                                        </p:attrNameLst>
+                                      </p:cBhvr>
+                                      <p:to>
+                                        <p:strVal val="visible"/>
+                                      </p:to>
+                                    </p:set>
+                                  </p:childTnLst>
+                                </p:cTn>
+                              </p:par>
+                              <p:par>
+                                <p:cTn id="17" presetID="1" presetClass="entr" presetSubtype="0" fill="hold" nodeType="withEffect">
+                                  <p:stCondLst>
+                                    <p:cond delay="0"/>
+                                  </p:stCondLst>
+                                  <p:childTnLst>
+                                    <p:set>
+                                      <p:cBhvr>
+                                        <p:cTn id="18" dur="1" fill="hold">
+                                          <p:stCondLst>
+                                            <p:cond delay="0"/>
+                                          </p:stCondLst>
+                                        </p:cTn>
+                                        <p:tgtEl>
+                                          <p:spTgt spid="37"/>
+                                        </p:tgtEl>
+                                        <p:attrNameLst>
+                                          <p:attrName>style.visibility</p:attrName>
+                                        </p:attrNameLst>
+                                      </p:cBhvr>
+                                      <p:to>
+                                        <p:strVal val="visible"/>
+                                      </p:to>
+                                    </p:set>
+                                  </p:childTnLst>
+                                </p:cTn>
+                              </p:par>
+                            </p:childTnLst>
+                          </p:cTn>
+                        </p:par>
+                      </p:childTnLst>
+                    </p:cTn>
+                  </p:par>
+                  <p:par>
+                    <p:cTn id="19" fill="hold">
+                      <p:stCondLst>
+                        <p:cond delay="indefinite"/>
+                      </p:stCondLst>
+                      <p:childTnLst>
+                        <p:par>
+                          <p:cTn id="20" fill="hold">
+                            <p:stCondLst>
+                              <p:cond delay="0"/>
+                            </p:stCondLst>
+                            <p:childTnLst>
+                              <p:par>
+                                <p:cTn id="21" presetID="1" presetClass="entr" presetSubtype="0" fill="hold" grpId="0" nodeType="clickEffect">
+                                  <p:stCondLst>
+                                    <p:cond delay="0"/>
+                                  </p:stCondLst>
+                                  <p:childTnLst>
+                                    <p:set>
+                                      <p:cBhvr>
+                                        <p:cTn id="22" dur="1" fill="hold">
+                                          <p:stCondLst>
+                                            <p:cond delay="0"/>
+                                          </p:stCondLst>
+                                        </p:cTn>
+                                        <p:tgtEl>
+                                          <p:spTgt spid="26"/>
+                                        </p:tgtEl>
+                                        <p:attrNameLst>
+                                          <p:attrName>style.visibility</p:attrName>
+                                        </p:attrNameLst>
+                                      </p:cBhvr>
+                                      <p:to>
+                                        <p:strVal val="visible"/>
+                                      </p:to>
+                                    </p:set>
+                                  </p:childTnLst>
+                                </p:cTn>
+                              </p:par>
+                            </p:childTnLst>
+                          </p:cTn>
+                        </p:par>
+                      </p:childTnLst>
+                    </p:cTn>
+                  </p:par>
+                </p:childTnLst>
+              </p:cTn>
+              <p:prevCondLst>
+                <p:cond evt="onPrev" delay="0">
+                  <p:tgtEl>
+                    <p:sldTgt/>
+                  </p:tgtEl>
+                </p:cond>
+              </p:prevCondLst>
+              <p:nextCondLst>
+                <p:cond evt="onNext" delay="0">
+                  <p:tgtEl>
+                    <p:sldTgt/>
+                  </p:tgtEl>
+                </p:cond>
+              </p:nextCondLst>
+            </p:seq>
+          </p:childTnLst>
+        </p:cTn>
+      </p:par>
+    </p:tnLst>
+    <p:bldLst>
+      <p:bldP spid="4" grpId="0"/>
+      <p:bldP spid="33" grpId="0"/>
+      <p:bldP spid="26" grpId="0"/>
+    </p:bldLst>
+  </p:timing>
+</p:sld>
+</file>
+
+<file path=ppt/slides/slide42.xml><?xml version="1.0" encoding="utf-8"?>
 <p:sld xmlns:a="http://schemas.openxmlformats.org/drawingml/2006/main" xmlns:r="http://schemas.openxmlformats.org/officeDocument/2006/relationships" xmlns:p="http://schemas.openxmlformats.org/presentationml/2006/main">
   <p:cSld>
     <p:spTree>
@@ -39160,13 +39344,13 @@
           <p:nvPr>
             <p:extLst>
               <p:ext uri="{D42A27DB-BD31-4B8C-83A1-F6EECF244321}">
-                <p14:modId xmlns:p14="http://schemas.microsoft.com/office/powerpoint/2010/main" val="1785984543"/>
+                <p14:modId xmlns:p14="http://schemas.microsoft.com/office/powerpoint/2010/main" val="2582395671"/>
               </p:ext>
             </p:extLst>
           </p:nvPr>
         </p:nvGraphicFramePr>
         <p:xfrm>
-          <a:off x="1832116" y="714375"/>
+          <a:off x="1832116" y="742950"/>
           <a:ext cx="6400799" cy="2209800"/>
         </p:xfrm>
         <a:graphic>
@@ -41065,13 +41249,18 @@
         </p:nvSpPr>
         <p:spPr>
           <a:xfrm>
-            <a:off x="2819400" y="4481294"/>
-            <a:ext cx="6475525" cy="646331"/>
+            <a:off x="2928839" y="4579179"/>
+            <a:ext cx="5121467" cy="523220"/>
           </a:xfrm>
           <a:prstGeom prst="rect">
             <a:avLst/>
           </a:prstGeom>
           <a:noFill/>
+          <a:ln>
+            <a:solidFill>
+              <a:schemeClr val="accent1"/>
+            </a:solidFill>
+          </a:ln>
         </p:spPr>
         <p:txBody>
           <a:bodyPr wrap="none" rtlCol="0">
@@ -41080,30 +41269,20 @@
           <a:lstStyle/>
           <a:p>
             <a:r>
-              <a:rPr lang="en-US" dirty="0"/>
+              <a:rPr lang="en-US" sz="1400" dirty="0"/>
               <a:t>Normal equation</a:t>
             </a:r>
           </a:p>
           <a:p>
             <a:r>
-              <a:rPr lang="en-US" dirty="0"/>
-              <a:t>https://</a:t>
-            </a:r>
-            <a:r>
-              <a:rPr lang="en-US" dirty="0" err="1"/>
-              <a:t>en.wikipedia.org</a:t>
-            </a:r>
-            <a:r>
-              <a:rPr lang="en-US" dirty="0"/>
-              <a:t>/wiki/</a:t>
-            </a:r>
-            <a:r>
-              <a:rPr lang="en-US" dirty="0" err="1"/>
-              <a:t>Linear_least_squares</a:t>
-            </a:r>
-            <a:r>
-              <a:rPr lang="en-US" dirty="0"/>
-              <a:t>_(mathematics)</a:t>
+              <a:rPr lang="en-US" sz="1400" dirty="0">
+                <a:hlinkClick r:id="rId23"/>
+              </a:rPr>
+              <a:t>https://en.wikipedia.org/wiki/Linear_least_squares_(mathematics)</a:t>
+            </a:r>
+            <a:r>
+              <a:rPr lang="en-US" sz="1400" dirty="0"/>
+              <a:t> </a:t>
             </a:r>
           </a:p>
         </p:txBody>
@@ -41340,85 +41519,7 @@
 </p:sld>
 </file>
 
-<file path=ppt/slides/slide41.xml><?xml version="1.0" encoding="utf-8"?>
-<p:sld xmlns:a="http://schemas.openxmlformats.org/drawingml/2006/main" xmlns:r="http://schemas.openxmlformats.org/officeDocument/2006/relationships" xmlns:p="http://schemas.openxmlformats.org/presentationml/2006/main">
-  <p:cSld>
-    <p:spTree>
-      <p:nvGrpSpPr>
-        <p:cNvPr id="1" name=""/>
-        <p:cNvGrpSpPr/>
-        <p:nvPr/>
-      </p:nvGrpSpPr>
-      <p:grpSpPr>
-        <a:xfrm>
-          <a:off x="0" y="0"/>
-          <a:ext cx="0" cy="0"/>
-          <a:chOff x="0" y="0"/>
-          <a:chExt cx="0" cy="0"/>
-        </a:xfrm>
-      </p:grpSpPr>
-      <p:pic>
-        <p:nvPicPr>
-          <p:cNvPr id="2" name="Picture 1"/>
-          <p:cNvPicPr>
-            <a:picLocks noChangeAspect="1"/>
-          </p:cNvPicPr>
-          <p:nvPr/>
-        </p:nvPicPr>
-        <p:blipFill>
-          <a:blip r:embed="rId2"/>
-          <a:stretch>
-            <a:fillRect/>
-          </a:stretch>
-        </p:blipFill>
-        <p:spPr>
-          <a:xfrm>
-            <a:off x="1155700" y="0"/>
-            <a:ext cx="6830786" cy="5143500"/>
-          </a:xfrm>
-          <a:prstGeom prst="rect">
-            <a:avLst/>
-          </a:prstGeom>
-        </p:spPr>
-      </p:pic>
-      <p:pic>
-        <p:nvPicPr>
-          <p:cNvPr id="3" name="Picture 2"/>
-          <p:cNvPicPr>
-            <a:picLocks noChangeAspect="1"/>
-          </p:cNvPicPr>
-          <p:nvPr/>
-        </p:nvPicPr>
-        <p:blipFill>
-          <a:blip r:embed="rId3"/>
-          <a:stretch>
-            <a:fillRect/>
-          </a:stretch>
-        </p:blipFill>
-        <p:spPr>
-          <a:xfrm>
-            <a:off x="4800600" y="285750"/>
-            <a:ext cx="4114800" cy="502827"/>
-          </a:xfrm>
-          <a:prstGeom prst="rect">
-            <a:avLst/>
-          </a:prstGeom>
-        </p:spPr>
-      </p:pic>
-    </p:spTree>
-    <p:extLst>
-      <p:ext uri="{BB962C8B-B14F-4D97-AF65-F5344CB8AC3E}">
-        <p14:creationId xmlns:p14="http://schemas.microsoft.com/office/powerpoint/2010/main" val="528568990"/>
-      </p:ext>
-    </p:extLst>
-  </p:cSld>
-  <p:clrMapOvr>
-    <a:masterClrMapping/>
-  </p:clrMapOvr>
-</p:sld>
-</file>
-
-<file path=ppt/slides/slide42.xml><?xml version="1.0" encoding="utf-8"?>
+<file path=ppt/slides/slide43.xml><?xml version="1.0" encoding="utf-8"?>
 <p:sld xmlns:a="http://schemas.openxmlformats.org/drawingml/2006/main" xmlns:r="http://schemas.openxmlformats.org/officeDocument/2006/relationships" xmlns:p="http://schemas.openxmlformats.org/presentationml/2006/main">
   <p:cSld>
     <p:spTree>
@@ -41443,8 +41544,8 @@
         </p:nvSpPr>
         <p:spPr>
           <a:xfrm>
-            <a:off x="3362227" y="4552950"/>
-            <a:ext cx="4486373" cy="461665"/>
+            <a:off x="2941613" y="4636752"/>
+            <a:ext cx="4486373" cy="400110"/>
           </a:xfrm>
           <a:prstGeom prst="rect">
             <a:avLst/>
@@ -41458,7 +41559,7 @@
           <a:lstStyle/>
           <a:p>
             <a:r>
-              <a:rPr lang="en-US" sz="2400" b="1" dirty="0" err="1">
+              <a:rPr lang="en-US" sz="2000" b="1" dirty="0" err="1">
                 <a:solidFill>
                   <a:srgbClr val="002060"/>
                 </a:solidFill>
@@ -41468,7 +41569,7 @@
               <a:t>pinv</a:t>
             </a:r>
             <a:r>
-              <a:rPr lang="en-US" sz="2400" b="1" dirty="0">
+              <a:rPr lang="en-US" sz="2000" b="1" dirty="0">
                 <a:solidFill>
                   <a:srgbClr val="002060"/>
                 </a:solidFill>
@@ -41585,11 +41686,11 @@
               </a:lnSpc>
             </a:pPr>
             <a:r>
-              <a:rPr lang="en-US" sz="2800" dirty="0" err="1"/>
+              <a:rPr lang="en-US" sz="2000" dirty="0" err="1"/>
               <a:t>Matlab</a:t>
             </a:r>
             <a:r>
-              <a:rPr lang="en-US" sz="2800" dirty="0"/>
+              <a:rPr lang="en-US" sz="2400" dirty="0"/>
               <a:t>/Octave: </a:t>
             </a:r>
           </a:p>
@@ -41672,7 +41773,7 @@
         <p:spPr>
           <a:xfrm>
             <a:off x="685800" y="1733550"/>
-            <a:ext cx="8153400" cy="2677656"/>
+            <a:ext cx="8153400" cy="2246769"/>
           </a:xfrm>
           <a:prstGeom prst="rect">
             <a:avLst/>
@@ -41686,46 +41787,46 @@
           <a:lstStyle/>
           <a:p>
             <a:r>
-              <a:rPr lang="en-US" sz="2400" dirty="0" err="1"/>
+              <a:rPr lang="en-US" sz="2000" dirty="0" err="1"/>
               <a:t>numpy.linalg.solve</a:t>
             </a:r>
             <a:r>
-              <a:rPr lang="en-US" sz="2400" dirty="0"/>
+              <a:rPr lang="en-US" sz="2000" dirty="0"/>
               <a:t>(a, b)</a:t>
             </a:r>
           </a:p>
           <a:p>
             <a:r>
-              <a:rPr lang="en-US" sz="2400" dirty="0">
+              <a:rPr lang="en-US" sz="2000" dirty="0">
                 <a:hlinkClick r:id="rId9"/>
               </a:rPr>
               <a:t>http://docs.scipy.org/doc/numpy-1.10.1/reference/generated/numpy.linalg.solve.html</a:t>
             </a:r>
-            <a:endParaRPr lang="en-US" sz="2400" dirty="0"/>
-          </a:p>
-          <a:p>
-            <a:endParaRPr lang="en-US" sz="2400" dirty="0"/>
-          </a:p>
-          <a:p>
-            <a:r>
-              <a:rPr lang="en-US" sz="2400" b="1" dirty="0"/>
+            <a:endParaRPr lang="en-US" sz="2000" dirty="0"/>
+          </a:p>
+          <a:p>
+            <a:endParaRPr lang="en-US" sz="2000" dirty="0"/>
+          </a:p>
+          <a:p>
+            <a:r>
+              <a:rPr lang="en-US" sz="2000" b="1" dirty="0"/>
               <a:t>theta = </a:t>
             </a:r>
             <a:r>
-              <a:rPr lang="en-US" sz="2400" b="1" dirty="0" err="1"/>
+              <a:rPr lang="en-US" sz="2000" b="1" dirty="0" err="1"/>
               <a:t>np.linalg.solve</a:t>
             </a:r>
             <a:r>
-              <a:rPr lang="en-US" sz="2400" b="1" dirty="0"/>
+              <a:rPr lang="en-US" sz="2000" b="1" dirty="0"/>
               <a:t>(X, y) </a:t>
             </a:r>
           </a:p>
           <a:p>
-            <a:endParaRPr lang="en-US" sz="2400" dirty="0"/>
-          </a:p>
-          <a:p>
-            <a:r>
-              <a:rPr lang="en-US" sz="2400" dirty="0"/>
+            <a:endParaRPr lang="en-US" sz="2000" dirty="0"/>
+          </a:p>
+          <a:p>
+            <a:r>
+              <a:rPr lang="en-US" sz="2000" dirty="0"/>
               <a:t>Assumes X is not singular, and is square</a:t>
             </a:r>
           </a:p>
@@ -41966,7 +42067,85 @@
 </p:sld>
 </file>
 
-<file path=ppt/slides/slide43.xml><?xml version="1.0" encoding="utf-8"?>
+<file path=ppt/slides/slide44.xml><?xml version="1.0" encoding="utf-8"?>
+<p:sld xmlns:a="http://schemas.openxmlformats.org/drawingml/2006/main" xmlns:r="http://schemas.openxmlformats.org/officeDocument/2006/relationships" xmlns:p="http://schemas.openxmlformats.org/presentationml/2006/main">
+  <p:cSld>
+    <p:spTree>
+      <p:nvGrpSpPr>
+        <p:cNvPr id="1" name=""/>
+        <p:cNvGrpSpPr/>
+        <p:nvPr/>
+      </p:nvGrpSpPr>
+      <p:grpSpPr>
+        <a:xfrm>
+          <a:off x="0" y="0"/>
+          <a:ext cx="0" cy="0"/>
+          <a:chOff x="0" y="0"/>
+          <a:chExt cx="0" cy="0"/>
+        </a:xfrm>
+      </p:grpSpPr>
+      <p:pic>
+        <p:nvPicPr>
+          <p:cNvPr id="2" name="Picture 1"/>
+          <p:cNvPicPr>
+            <a:picLocks noChangeAspect="1"/>
+          </p:cNvPicPr>
+          <p:nvPr/>
+        </p:nvPicPr>
+        <p:blipFill>
+          <a:blip r:embed="rId2"/>
+          <a:stretch>
+            <a:fillRect/>
+          </a:stretch>
+        </p:blipFill>
+        <p:spPr>
+          <a:xfrm>
+            <a:off x="1155700" y="0"/>
+            <a:ext cx="6830786" cy="5143500"/>
+          </a:xfrm>
+          <a:prstGeom prst="rect">
+            <a:avLst/>
+          </a:prstGeom>
+        </p:spPr>
+      </p:pic>
+      <p:pic>
+        <p:nvPicPr>
+          <p:cNvPr id="3" name="Picture 2"/>
+          <p:cNvPicPr>
+            <a:picLocks noChangeAspect="1"/>
+          </p:cNvPicPr>
+          <p:nvPr/>
+        </p:nvPicPr>
+        <p:blipFill>
+          <a:blip r:embed="rId3"/>
+          <a:stretch>
+            <a:fillRect/>
+          </a:stretch>
+        </p:blipFill>
+        <p:spPr>
+          <a:xfrm>
+            <a:off x="4800600" y="285750"/>
+            <a:ext cx="4114800" cy="502827"/>
+          </a:xfrm>
+          <a:prstGeom prst="rect">
+            <a:avLst/>
+          </a:prstGeom>
+        </p:spPr>
+      </p:pic>
+    </p:spTree>
+    <p:extLst>
+      <p:ext uri="{BB962C8B-B14F-4D97-AF65-F5344CB8AC3E}">
+        <p14:creationId xmlns:p14="http://schemas.microsoft.com/office/powerpoint/2010/main" val="528568990"/>
+      </p:ext>
+    </p:extLst>
+  </p:cSld>
+  <p:clrMapOvr>
+    <a:masterClrMapping/>
+  </p:clrMapOvr>
+</p:sld>
+</file>
+
+<file path=ppt/slides/slide45.xml><?xml version="1.0" encoding="utf-8"?>
 <p:sld xmlns:a="http://schemas.openxmlformats.org/drawingml/2006/main" xmlns:r="http://schemas.openxmlformats.org/officeDocument/2006/relationships" xmlns:p="http://schemas.openxmlformats.org/presentationml/2006/main">
   <p:cSld>
     <p:spTree>
@@ -42512,7 +42691,7 @@
         </p:blipFill>
         <p:spPr>
           <a:xfrm>
-            <a:off x="6291834" y="3448049"/>
+            <a:off x="6291834" y="3409950"/>
             <a:ext cx="261366" cy="214821"/>
           </a:xfrm>
           <a:prstGeom prst="rect">
@@ -42766,7 +42945,7 @@
 </p:sld>
 </file>
 
-<file path=ppt/slides/slide44.xml><?xml version="1.0" encoding="utf-8"?>
+<file path=ppt/slides/slide46.xml><?xml version="1.0" encoding="utf-8"?>
 <p:sld xmlns:a="http://schemas.openxmlformats.org/drawingml/2006/main" xmlns:r="http://schemas.openxmlformats.org/officeDocument/2006/relationships" xmlns:p="http://schemas.openxmlformats.org/presentationml/2006/main">
   <p:cSld>
     <p:spTree>
@@ -43100,215 +43279,6 @@
     <p:extLst>
       <p:ext uri="{BB962C8B-B14F-4D97-AF65-F5344CB8AC3E}">
         <p14:creationId xmlns:p14="http://schemas.microsoft.com/office/powerpoint/2010/main" val="2365235890"/>
-      </p:ext>
-    </p:extLst>
-  </p:cSld>
-  <p:clrMapOvr>
-    <a:masterClrMapping/>
-  </p:clrMapOvr>
-</p:sld>
-</file>
-
-<file path=ppt/slides/slide45.xml><?xml version="1.0" encoding="utf-8"?>
-<p:sld xmlns:a="http://schemas.openxmlformats.org/drawingml/2006/main" xmlns:r="http://schemas.openxmlformats.org/officeDocument/2006/relationships" xmlns:p="http://schemas.openxmlformats.org/presentationml/2006/main">
-  <p:cSld>
-    <p:spTree>
-      <p:nvGrpSpPr>
-        <p:cNvPr id="1" name=""/>
-        <p:cNvGrpSpPr/>
-        <p:nvPr/>
-      </p:nvGrpSpPr>
-      <p:grpSpPr>
-        <a:xfrm>
-          <a:off x="0" y="0"/>
-          <a:ext cx="0" cy="0"/>
-          <a:chOff x="0" y="0"/>
-          <a:chExt cx="0" cy="0"/>
-        </a:xfrm>
-      </p:grpSpPr>
-      <p:sp>
-        <p:nvSpPr>
-          <p:cNvPr id="2" name="TextBox 1"/>
-          <p:cNvSpPr txBox="1"/>
-          <p:nvPr/>
-        </p:nvSpPr>
-        <p:spPr>
-          <a:xfrm>
-            <a:off x="457200" y="514350"/>
-            <a:ext cx="6762750" cy="1446550"/>
-          </a:xfrm>
-          <a:prstGeom prst="rect">
-            <a:avLst/>
-          </a:prstGeom>
-          <a:noFill/>
-        </p:spPr>
-        <p:txBody>
-          <a:bodyPr wrap="square" rtlCol="0">
-            <a:spAutoFit/>
-          </a:bodyPr>
-          <a:lstStyle/>
-          <a:p>
-            <a:r>
-              <a:rPr lang="en-US" sz="2400" baseline="30000" dirty="0"/>
-              <a:t>Problem:</a:t>
-            </a:r>
-            <a:r>
-              <a:rPr lang="en-US" sz="2400" dirty="0"/>
-              <a:t> </a:t>
-            </a:r>
-            <a:r>
-              <a:rPr lang="en-US" sz="2400" baseline="30000" dirty="0"/>
-              <a:t>considering different cities for opening a new outlet. The chain already has trucks in various cities and you have data for profits and populations from the cities.</a:t>
-            </a:r>
-          </a:p>
-          <a:p>
-            <a:endParaRPr lang="en-US" sz="2400" baseline="30000" dirty="0"/>
-          </a:p>
-          <a:p>
-            <a:r>
-              <a:rPr lang="en-US" sz="2400" baseline="30000" dirty="0"/>
-              <a:t>You would like to use this data to help you select which city to expand to next.</a:t>
-            </a:r>
-            <a:endParaRPr lang="en-US" sz="2400" dirty="0"/>
-          </a:p>
-        </p:txBody>
-      </p:sp>
-      <p:pic>
-        <p:nvPicPr>
-          <p:cNvPr id="3" name="Picture 2"/>
-          <p:cNvPicPr>
-            <a:picLocks noChangeAspect="1"/>
-          </p:cNvPicPr>
-          <p:nvPr/>
-        </p:nvPicPr>
-        <p:blipFill>
-          <a:blip r:embed="rId2"/>
-          <a:stretch>
-            <a:fillRect/>
-          </a:stretch>
-        </p:blipFill>
-        <p:spPr>
-          <a:xfrm>
-            <a:off x="533400" y="1962150"/>
-            <a:ext cx="1892300" cy="2743200"/>
-          </a:xfrm>
-          <a:prstGeom prst="rect">
-            <a:avLst/>
-          </a:prstGeom>
-        </p:spPr>
-      </p:pic>
-      <p:pic>
-        <p:nvPicPr>
-          <p:cNvPr id="5" name="Picture 4"/>
-          <p:cNvPicPr>
-            <a:picLocks noChangeAspect="1"/>
-          </p:cNvPicPr>
-          <p:nvPr/>
-        </p:nvPicPr>
-        <p:blipFill>
-          <a:blip r:embed="rId3"/>
-          <a:stretch>
-            <a:fillRect/>
-          </a:stretch>
-        </p:blipFill>
-        <p:spPr>
-          <a:xfrm>
-            <a:off x="3505200" y="1962150"/>
-            <a:ext cx="1257300" cy="2730500"/>
-          </a:xfrm>
-          <a:prstGeom prst="rect">
-            <a:avLst/>
-          </a:prstGeom>
-        </p:spPr>
-      </p:pic>
-    </p:spTree>
-    <p:extLst>
-      <p:ext uri="{BB962C8B-B14F-4D97-AF65-F5344CB8AC3E}">
-        <p14:creationId xmlns:p14="http://schemas.microsoft.com/office/powerpoint/2010/main" val="349307202"/>
-      </p:ext>
-    </p:extLst>
-  </p:cSld>
-  <p:clrMapOvr>
-    <a:masterClrMapping/>
-  </p:clrMapOvr>
-</p:sld>
-</file>
-
-<file path=ppt/slides/slide46.xml><?xml version="1.0" encoding="utf-8"?>
-<p:sld xmlns:a="http://schemas.openxmlformats.org/drawingml/2006/main" xmlns:r="http://schemas.openxmlformats.org/officeDocument/2006/relationships" xmlns:p="http://schemas.openxmlformats.org/presentationml/2006/main">
-  <p:cSld>
-    <p:spTree>
-      <p:nvGrpSpPr>
-        <p:cNvPr id="1" name=""/>
-        <p:cNvGrpSpPr/>
-        <p:nvPr/>
-      </p:nvGrpSpPr>
-      <p:grpSpPr>
-        <a:xfrm>
-          <a:off x="0" y="0"/>
-          <a:ext cx="0" cy="0"/>
-          <a:chOff x="0" y="0"/>
-          <a:chExt cx="0" cy="0"/>
-        </a:xfrm>
-      </p:grpSpPr>
-      <p:sp>
-        <p:nvSpPr>
-          <p:cNvPr id="2" name="TextBox 1"/>
-          <p:cNvSpPr txBox="1"/>
-          <p:nvPr/>
-        </p:nvSpPr>
-        <p:spPr>
-          <a:xfrm>
-            <a:off x="457200" y="514350"/>
-            <a:ext cx="6762750" cy="338554"/>
-          </a:xfrm>
-          <a:prstGeom prst="rect">
-            <a:avLst/>
-          </a:prstGeom>
-          <a:noFill/>
-        </p:spPr>
-        <p:txBody>
-          <a:bodyPr wrap="square" rtlCol="0">
-            <a:spAutoFit/>
-          </a:bodyPr>
-          <a:lstStyle/>
-          <a:p>
-            <a:r>
-              <a:rPr lang="en-US" sz="2400" baseline="30000" dirty="0"/>
-              <a:t>Visualize data</a:t>
-            </a:r>
-            <a:endParaRPr lang="en-US" sz="2400" dirty="0"/>
-          </a:p>
-        </p:txBody>
-      </p:sp>
-      <p:pic>
-        <p:nvPicPr>
-          <p:cNvPr id="4" name="Picture 3"/>
-          <p:cNvPicPr>
-            <a:picLocks noChangeAspect="1"/>
-          </p:cNvPicPr>
-          <p:nvPr/>
-        </p:nvPicPr>
-        <p:blipFill>
-          <a:blip r:embed="rId2"/>
-          <a:stretch>
-            <a:fillRect/>
-          </a:stretch>
-        </p:blipFill>
-        <p:spPr>
-          <a:xfrm>
-            <a:off x="3470182" y="611453"/>
-            <a:ext cx="5642068" cy="4522522"/>
-          </a:xfrm>
-          <a:prstGeom prst="rect">
-            <a:avLst/>
-          </a:prstGeom>
-        </p:spPr>
-      </p:pic>
-    </p:spTree>
-    <p:extLst>
-      <p:ext uri="{BB962C8B-B14F-4D97-AF65-F5344CB8AC3E}">
-        <p14:creationId xmlns:p14="http://schemas.microsoft.com/office/powerpoint/2010/main" val="2102326221"/>
       </p:ext>
     </p:extLst>
   </p:cSld>
@@ -43343,8 +43313,8 @@
         </p:nvSpPr>
         <p:spPr>
           <a:xfrm>
-            <a:off x="304800" y="514350"/>
-            <a:ext cx="6762750" cy="338554"/>
+            <a:off x="457200" y="514350"/>
+            <a:ext cx="6762750" cy="1446550"/>
           </a:xfrm>
           <a:prstGeom prst="rect">
             <a:avLst/>
@@ -43359,7 +43329,24 @@
           <a:p>
             <a:r>
               <a:rPr lang="en-US" sz="2400" baseline="30000" dirty="0"/>
-              <a:t>Run linear regression</a:t>
+              <a:t>Problem:</a:t>
+            </a:r>
+            <a:r>
+              <a:rPr lang="en-US" sz="2400" dirty="0"/>
+              <a:t> </a:t>
+            </a:r>
+            <a:r>
+              <a:rPr lang="en-US" sz="2400" baseline="30000" dirty="0"/>
+              <a:t>considering different cities for opening a new outlet. The chain already has trucks in various cities and you have data for profits and populations from the cities.</a:t>
+            </a:r>
+          </a:p>
+          <a:p>
+            <a:endParaRPr lang="en-US" sz="2400" baseline="30000" dirty="0"/>
+          </a:p>
+          <a:p>
+            <a:r>
+              <a:rPr lang="en-US" sz="2400" baseline="30000" dirty="0"/>
+              <a:t>You would like to use this data to help you select which city to expand to next.</a:t>
             </a:r>
             <a:endParaRPr lang="en-US" sz="2400" dirty="0"/>
           </a:p>
@@ -43381,64 +43368,42 @@
         </p:blipFill>
         <p:spPr>
           <a:xfrm>
-            <a:off x="3124200" y="361950"/>
-            <a:ext cx="5866860" cy="4565650"/>
+            <a:off x="533400" y="1962150"/>
+            <a:ext cx="1892300" cy="2743200"/>
           </a:xfrm>
           <a:prstGeom prst="rect">
             <a:avLst/>
           </a:prstGeom>
         </p:spPr>
       </p:pic>
-      <p:sp>
-        <p:nvSpPr>
-          <p:cNvPr id="5" name="Rectangle 4"/>
-          <p:cNvSpPr/>
+      <p:pic>
+        <p:nvPicPr>
+          <p:cNvPr id="5" name="Picture 4"/>
+          <p:cNvPicPr>
+            <a:picLocks noChangeAspect="1"/>
+          </p:cNvPicPr>
           <p:nvPr/>
-        </p:nvSpPr>
+        </p:nvPicPr>
+        <p:blipFill>
+          <a:blip r:embed="rId3"/>
+          <a:stretch>
+            <a:fillRect/>
+          </a:stretch>
+        </p:blipFill>
         <p:spPr>
           <a:xfrm>
-            <a:off x="228600" y="1428750"/>
-            <a:ext cx="2978804" cy="2862323"/>
+            <a:off x="3505200" y="1962150"/>
+            <a:ext cx="1257300" cy="2730500"/>
           </a:xfrm>
           <a:prstGeom prst="rect">
             <a:avLst/>
           </a:prstGeom>
         </p:spPr>
-        <p:txBody>
-          <a:bodyPr wrap="square">
-            <a:spAutoFit/>
-          </a:bodyPr>
-          <a:lstStyle/>
-          <a:p>
-            <a:r>
-              <a:rPr lang="en-US" dirty="0"/>
-              <a:t>Theta found by gradient descent: -3.630291 1.166362 </a:t>
-            </a:r>
-          </a:p>
-          <a:p>
-            <a:endParaRPr lang="en-US" dirty="0"/>
-          </a:p>
-          <a:p>
-            <a:r>
-              <a:rPr lang="en-US" dirty="0"/>
-              <a:t>For population = 35,000, we predict a profit of 4519.767868</a:t>
-            </a:r>
-          </a:p>
-          <a:p>
-            <a:endParaRPr lang="en-US" dirty="0"/>
-          </a:p>
-          <a:p>
-            <a:r>
-              <a:rPr lang="en-US" dirty="0"/>
-              <a:t>For population = 70,000, we predict a profit of 45342.450129</a:t>
-            </a:r>
-          </a:p>
-        </p:txBody>
-      </p:sp>
+      </p:pic>
     </p:spTree>
     <p:extLst>
       <p:ext uri="{BB962C8B-B14F-4D97-AF65-F5344CB8AC3E}">
-        <p14:creationId xmlns:p14="http://schemas.microsoft.com/office/powerpoint/2010/main" val="383610225"/>
+        <p14:creationId xmlns:p14="http://schemas.microsoft.com/office/powerpoint/2010/main" val="349307202"/>
       </p:ext>
     </p:extLst>
   </p:cSld>
@@ -43473,8 +43438,8 @@
         </p:nvSpPr>
         <p:spPr>
           <a:xfrm>
-            <a:off x="762000" y="133350"/>
-            <a:ext cx="7561285" cy="584776"/>
+            <a:off x="457200" y="514350"/>
+            <a:ext cx="6762750" cy="338554"/>
           </a:xfrm>
           <a:prstGeom prst="rect">
             <a:avLst/>
@@ -43482,21 +43447,22 @@
           <a:noFill/>
         </p:spPr>
         <p:txBody>
-          <a:bodyPr wrap="none" rtlCol="0">
+          <a:bodyPr wrap="square" rtlCol="0">
             <a:spAutoFit/>
           </a:bodyPr>
           <a:lstStyle/>
           <a:p>
             <a:r>
-              <a:rPr lang="en-US" sz="3200" dirty="0"/>
-              <a:t>Assessing the accuracy of model coefficients</a:t>
-            </a:r>
+              <a:rPr lang="en-US" sz="2400" baseline="30000" dirty="0"/>
+              <a:t>Visualize data</a:t>
+            </a:r>
+            <a:endParaRPr lang="en-US" sz="2400" dirty="0"/>
           </a:p>
         </p:txBody>
       </p:sp>
       <p:pic>
         <p:nvPicPr>
-          <p:cNvPr id="6" name="Picture 5"/>
+          <p:cNvPr id="4" name="Picture 3"/>
           <p:cNvPicPr>
             <a:picLocks noChangeAspect="1"/>
           </p:cNvPicPr>
@@ -43510,199 +43476,18 @@
         </p:blipFill>
         <p:spPr>
           <a:xfrm>
-            <a:off x="5715000" y="1466850"/>
-            <a:ext cx="1905000" cy="800100"/>
+            <a:off x="3470182" y="611453"/>
+            <a:ext cx="5642068" cy="4522522"/>
           </a:xfrm>
           <a:prstGeom prst="rect">
             <a:avLst/>
           </a:prstGeom>
         </p:spPr>
       </p:pic>
-      <p:pic>
-        <p:nvPicPr>
-          <p:cNvPr id="7" name="Picture 6"/>
-          <p:cNvPicPr>
-            <a:picLocks noChangeAspect="1"/>
-          </p:cNvPicPr>
-          <p:nvPr/>
-        </p:nvPicPr>
-        <p:blipFill>
-          <a:blip r:embed="rId3"/>
-          <a:stretch>
-            <a:fillRect/>
-          </a:stretch>
-        </p:blipFill>
-        <p:spPr>
-          <a:xfrm>
-            <a:off x="5867400" y="2495550"/>
-            <a:ext cx="1714500" cy="381000"/>
-          </a:xfrm>
-          <a:prstGeom prst="rect">
-            <a:avLst/>
-          </a:prstGeom>
-        </p:spPr>
-      </p:pic>
-      <p:pic>
-        <p:nvPicPr>
-          <p:cNvPr id="8" name="Picture 7"/>
-          <p:cNvPicPr>
-            <a:picLocks noChangeAspect="1"/>
-          </p:cNvPicPr>
-          <p:nvPr/>
-        </p:nvPicPr>
-        <p:blipFill>
-          <a:blip r:embed="rId4"/>
-          <a:stretch>
-            <a:fillRect/>
-          </a:stretch>
-        </p:blipFill>
-        <p:spPr>
-          <a:xfrm>
-            <a:off x="5486400" y="3194050"/>
-            <a:ext cx="2806700" cy="673100"/>
-          </a:xfrm>
-          <a:prstGeom prst="rect">
-            <a:avLst/>
-          </a:prstGeom>
-        </p:spPr>
-      </p:pic>
-      <p:pic>
-        <p:nvPicPr>
-          <p:cNvPr id="9" name="Picture 8"/>
-          <p:cNvPicPr>
-            <a:picLocks noChangeAspect="1"/>
-          </p:cNvPicPr>
-          <p:nvPr/>
-        </p:nvPicPr>
-        <p:blipFill>
-          <a:blip r:embed="rId5"/>
-          <a:stretch>
-            <a:fillRect/>
-          </a:stretch>
-        </p:blipFill>
-        <p:spPr>
-          <a:xfrm>
-            <a:off x="4876800" y="4095750"/>
-            <a:ext cx="4191000" cy="990600"/>
-          </a:xfrm>
-          <a:prstGeom prst="rect">
-            <a:avLst/>
-          </a:prstGeom>
-        </p:spPr>
-      </p:pic>
-      <p:pic>
-        <p:nvPicPr>
-          <p:cNvPr id="10" name="Picture 9"/>
-          <p:cNvPicPr>
-            <a:picLocks noChangeAspect="1"/>
-          </p:cNvPicPr>
-          <p:nvPr/>
-        </p:nvPicPr>
-        <p:blipFill>
-          <a:blip r:embed="rId6"/>
-          <a:stretch>
-            <a:fillRect/>
-          </a:stretch>
-        </p:blipFill>
-        <p:spPr>
-          <a:xfrm>
-            <a:off x="5638800" y="819150"/>
-            <a:ext cx="2209800" cy="450980"/>
-          </a:xfrm>
-          <a:prstGeom prst="rect">
-            <a:avLst/>
-          </a:prstGeom>
-        </p:spPr>
-      </p:pic>
-      <p:sp>
-        <p:nvSpPr>
-          <p:cNvPr id="5" name="TextBox 4"/>
-          <p:cNvSpPr txBox="1"/>
-          <p:nvPr/>
-        </p:nvSpPr>
-        <p:spPr>
-          <a:xfrm>
-            <a:off x="0" y="666750"/>
-            <a:ext cx="5181600" cy="4708981"/>
-          </a:xfrm>
-          <a:prstGeom prst="rect">
-            <a:avLst/>
-          </a:prstGeom>
-          <a:noFill/>
-        </p:spPr>
-        <p:txBody>
-          <a:bodyPr wrap="square" rtlCol="0">
-            <a:spAutoFit/>
-          </a:bodyPr>
-          <a:lstStyle/>
-          <a:p>
-            <a:r>
-              <a:rPr lang="en-US" sz="2000" dirty="0"/>
-              <a:t>Linear regression with residual term. Represents what we can’t explain with our model.</a:t>
-            </a:r>
-          </a:p>
-          <a:p>
-            <a:endParaRPr lang="en-US" sz="2000" dirty="0"/>
-          </a:p>
-          <a:p>
-            <a:r>
-              <a:rPr lang="en-US" sz="2000" dirty="0"/>
-              <a:t>RSS measures the amount of variability that is left unexplained after performing the regression</a:t>
-            </a:r>
-          </a:p>
-          <a:p>
-            <a:endParaRPr lang="en-US" sz="2000" baseline="30000" dirty="0"/>
-          </a:p>
-          <a:p>
-            <a:r>
-              <a:rPr lang="en-US" sz="2000" dirty="0"/>
-              <a:t>TSS (Total sum of squares) measures the total variance when measuring the response y.</a:t>
-            </a:r>
-          </a:p>
-          <a:p>
-            <a:endParaRPr lang="en-US" sz="2000" dirty="0"/>
-          </a:p>
-          <a:p>
-            <a:r>
-              <a:rPr lang="en-US" sz="2000" dirty="0"/>
-              <a:t>R</a:t>
-            </a:r>
-            <a:r>
-              <a:rPr lang="en-US" sz="2000" baseline="30000" dirty="0"/>
-              <a:t>2</a:t>
-            </a:r>
-            <a:r>
-              <a:rPr lang="en-US" sz="2000" dirty="0"/>
-              <a:t>  amount of variance explained by our model</a:t>
-            </a:r>
-            <a:endParaRPr lang="en-US" sz="2000" baseline="30000" dirty="0"/>
-          </a:p>
-          <a:p>
-            <a:endParaRPr lang="en-US" sz="2000" baseline="30000" dirty="0"/>
-          </a:p>
-          <a:p>
-            <a:r>
-              <a:rPr lang="en-US" sz="2000" dirty="0"/>
-              <a:t>The RSE is an estimate of the standard deviation of </a:t>
-            </a:r>
-            <a:r>
-              <a:rPr lang="en-US" sz="2000" dirty="0" err="1"/>
-              <a:t>ε</a:t>
-            </a:r>
-            <a:r>
-              <a:rPr lang="en-US" sz="2000" dirty="0"/>
-              <a:t>. It is basically the average amount that the response will deviate from the true regression line. </a:t>
-            </a:r>
-          </a:p>
-          <a:p>
-            <a:endParaRPr lang="en-US" sz="2000" baseline="30000" dirty="0"/>
-          </a:p>
-        </p:txBody>
-      </p:sp>
     </p:spTree>
     <p:extLst>
       <p:ext uri="{BB962C8B-B14F-4D97-AF65-F5344CB8AC3E}">
-        <p14:creationId xmlns:p14="http://schemas.microsoft.com/office/powerpoint/2010/main" val="1620471663"/>
+        <p14:creationId xmlns:p14="http://schemas.microsoft.com/office/powerpoint/2010/main" val="2102326221"/>
       </p:ext>
     </p:extLst>
   </p:cSld>
@@ -43737,37 +43522,8 @@
         </p:nvSpPr>
         <p:spPr>
           <a:xfrm>
-            <a:off x="762000" y="133350"/>
-            <a:ext cx="3949919" cy="584776"/>
-          </a:xfrm>
-          <a:prstGeom prst="rect">
-            <a:avLst/>
-          </a:prstGeom>
-          <a:noFill/>
-        </p:spPr>
-        <p:txBody>
-          <a:bodyPr wrap="none" rtlCol="0">
-            <a:spAutoFit/>
-          </a:bodyPr>
-          <a:lstStyle/>
-          <a:p>
-            <a:r>
-              <a:rPr lang="en-US" sz="3200" dirty="0"/>
-              <a:t>Least square approach</a:t>
-            </a:r>
-          </a:p>
-        </p:txBody>
-      </p:sp>
-      <p:sp>
-        <p:nvSpPr>
-          <p:cNvPr id="5" name="TextBox 4"/>
-          <p:cNvSpPr txBox="1"/>
-          <p:nvPr/>
-        </p:nvSpPr>
-        <p:spPr>
-          <a:xfrm>
-            <a:off x="304800" y="3486150"/>
-            <a:ext cx="5334000" cy="1015663"/>
+            <a:off x="304800" y="514350"/>
+            <a:ext cx="6762750" cy="338554"/>
           </a:xfrm>
           <a:prstGeom prst="rect">
             <a:avLst/>
@@ -43781,32 +43537,16 @@
           <a:lstStyle/>
           <a:p>
             <a:r>
-              <a:rPr lang="en-US" sz="2000" dirty="0"/>
-              <a:t>The least squares approach chooses β</a:t>
-            </a:r>
-            <a:r>
-              <a:rPr lang="en-US" sz="2000" baseline="-25000" dirty="0"/>
-              <a:t>0</a:t>
-            </a:r>
-            <a:r>
-              <a:rPr lang="en-US" sz="2000" dirty="0"/>
-              <a:t> and β</a:t>
-            </a:r>
-            <a:r>
-              <a:rPr lang="en-US" sz="2000" baseline="-25000" dirty="0"/>
-              <a:t>1</a:t>
-            </a:r>
-            <a:r>
-              <a:rPr lang="en-US" sz="2000" dirty="0"/>
-              <a:t> to minimize the RSS. Using some calculus, one can show that the minimizers are:</a:t>
-            </a:r>
-            <a:endParaRPr lang="en-US" sz="2000" baseline="30000" dirty="0"/>
+              <a:rPr lang="en-US" sz="2400" baseline="30000" dirty="0"/>
+              <a:t>Run linear regression</a:t>
+            </a:r>
+            <a:endParaRPr lang="en-US" sz="2400" dirty="0"/>
           </a:p>
         </p:txBody>
       </p:sp>
       <p:pic>
         <p:nvPicPr>
-          <p:cNvPr id="6" name="Picture 5"/>
+          <p:cNvPr id="3" name="Picture 2"/>
           <p:cNvPicPr>
             <a:picLocks noChangeAspect="1"/>
           </p:cNvPicPr>
@@ -43820,114 +43560,64 @@
         </p:blipFill>
         <p:spPr>
           <a:xfrm>
-            <a:off x="3505200" y="1504950"/>
-            <a:ext cx="1905000" cy="800100"/>
+            <a:off x="3124200" y="361950"/>
+            <a:ext cx="5866860" cy="4565650"/>
           </a:xfrm>
           <a:prstGeom prst="rect">
             <a:avLst/>
           </a:prstGeom>
         </p:spPr>
       </p:pic>
-      <p:pic>
-        <p:nvPicPr>
-          <p:cNvPr id="10" name="Picture 9"/>
-          <p:cNvPicPr>
-            <a:picLocks noChangeAspect="1"/>
-          </p:cNvPicPr>
+      <p:sp>
+        <p:nvSpPr>
+          <p:cNvPr id="5" name="Rectangle 4"/>
+          <p:cNvSpPr/>
           <p:nvPr/>
-        </p:nvPicPr>
-        <p:blipFill>
-          <a:blip r:embed="rId3"/>
-          <a:stretch>
-            <a:fillRect/>
-          </a:stretch>
-        </p:blipFill>
+        </p:nvSpPr>
         <p:spPr>
           <a:xfrm>
-            <a:off x="3505200" y="819150"/>
-            <a:ext cx="2209800" cy="450980"/>
+            <a:off x="228600" y="1428750"/>
+            <a:ext cx="2978804" cy="2862323"/>
           </a:xfrm>
           <a:prstGeom prst="rect">
             <a:avLst/>
           </a:prstGeom>
         </p:spPr>
-      </p:pic>
-      <p:pic>
-        <p:nvPicPr>
-          <p:cNvPr id="3" name="Picture 2"/>
-          <p:cNvPicPr>
-            <a:picLocks noChangeAspect="1"/>
-          </p:cNvPicPr>
-          <p:nvPr/>
-        </p:nvPicPr>
-        <p:blipFill>
-          <a:blip r:embed="rId4"/>
-          <a:stretch>
-            <a:fillRect/>
-          </a:stretch>
-        </p:blipFill>
-        <p:spPr>
-          <a:xfrm>
-            <a:off x="5486400" y="3406241"/>
-            <a:ext cx="3534780" cy="1235609"/>
-          </a:xfrm>
-          <a:prstGeom prst="rect">
-            <a:avLst/>
-          </a:prstGeom>
-        </p:spPr>
-      </p:pic>
-      <p:pic>
-        <p:nvPicPr>
-          <p:cNvPr id="4" name="Picture 3"/>
-          <p:cNvPicPr>
-            <a:picLocks noChangeAspect="1"/>
-          </p:cNvPicPr>
-          <p:nvPr/>
-        </p:nvPicPr>
-        <p:blipFill>
-          <a:blip r:embed="rId5"/>
-          <a:stretch>
-            <a:fillRect/>
-          </a:stretch>
-        </p:blipFill>
-        <p:spPr>
-          <a:xfrm>
-            <a:off x="762000" y="2343150"/>
-            <a:ext cx="7683166" cy="615950"/>
-          </a:xfrm>
-          <a:prstGeom prst="rect">
-            <a:avLst/>
-          </a:prstGeom>
-        </p:spPr>
-      </p:pic>
-      <p:pic>
-        <p:nvPicPr>
-          <p:cNvPr id="11" name="Picture 10"/>
-          <p:cNvPicPr>
-            <a:picLocks noChangeAspect="1"/>
-          </p:cNvPicPr>
-          <p:nvPr/>
-        </p:nvPicPr>
-        <p:blipFill>
-          <a:blip r:embed="rId6"/>
-          <a:stretch>
-            <a:fillRect/>
-          </a:stretch>
-        </p:blipFill>
-        <p:spPr>
-          <a:xfrm>
-            <a:off x="6400800" y="57150"/>
-            <a:ext cx="2463800" cy="2348962"/>
-          </a:xfrm>
-          <a:prstGeom prst="rect">
-            <a:avLst/>
-          </a:prstGeom>
-        </p:spPr>
-      </p:pic>
+        <p:txBody>
+          <a:bodyPr wrap="square">
+            <a:spAutoFit/>
+          </a:bodyPr>
+          <a:lstStyle/>
+          <a:p>
+            <a:r>
+              <a:rPr lang="en-US" dirty="0"/>
+              <a:t>Theta found by gradient descent: -3.630291 1.166362 </a:t>
+            </a:r>
+          </a:p>
+          <a:p>
+            <a:endParaRPr lang="en-US" dirty="0"/>
+          </a:p>
+          <a:p>
+            <a:r>
+              <a:rPr lang="en-US" dirty="0"/>
+              <a:t>For population = 35,000, we predict a profit of 4519.767868</a:t>
+            </a:r>
+          </a:p>
+          <a:p>
+            <a:endParaRPr lang="en-US" dirty="0"/>
+          </a:p>
+          <a:p>
+            <a:r>
+              <a:rPr lang="en-US" dirty="0"/>
+              <a:t>For population = 70,000, we predict a profit of 45342.450129</a:t>
+            </a:r>
+          </a:p>
+        </p:txBody>
+      </p:sp>
     </p:spTree>
     <p:extLst>
       <p:ext uri="{BB962C8B-B14F-4D97-AF65-F5344CB8AC3E}">
-        <p14:creationId xmlns:p14="http://schemas.microsoft.com/office/powerpoint/2010/main" val="1297300796"/>
+        <p14:creationId xmlns:p14="http://schemas.microsoft.com/office/powerpoint/2010/main" val="383610225"/>
       </p:ext>
     </p:extLst>
   </p:cSld>
@@ -45027,8 +44717,8 @@
         </p:nvSpPr>
         <p:spPr>
           <a:xfrm>
-            <a:off x="457200" y="514350"/>
-            <a:ext cx="6762750" cy="338554"/>
+            <a:off x="762000" y="133350"/>
+            <a:ext cx="7561285" cy="584776"/>
           </a:xfrm>
           <a:prstGeom prst="rect">
             <a:avLst/>
@@ -45036,22 +44726,21 @@
           <a:noFill/>
         </p:spPr>
         <p:txBody>
-          <a:bodyPr wrap="square" rtlCol="0">
+          <a:bodyPr wrap="none" rtlCol="0">
             <a:spAutoFit/>
           </a:bodyPr>
           <a:lstStyle/>
           <a:p>
             <a:r>
-              <a:rPr lang="en-US" sz="2400" baseline="30000" dirty="0"/>
-              <a:t>Saving and plotting theta</a:t>
-            </a:r>
-            <a:endParaRPr lang="en-US" sz="2400" dirty="0"/>
+              <a:rPr lang="en-US" sz="3200" dirty="0"/>
+              <a:t>Assessing the accuracy of model coefficients</a:t>
+            </a:r>
           </a:p>
         </p:txBody>
       </p:sp>
       <p:pic>
         <p:nvPicPr>
-          <p:cNvPr id="4" name="Picture 3"/>
+          <p:cNvPr id="6" name="Picture 5"/>
           <p:cNvPicPr>
             <a:picLocks noChangeAspect="1"/>
           </p:cNvPicPr>
@@ -45065,8 +44754,8 @@
         </p:blipFill>
         <p:spPr>
           <a:xfrm>
-            <a:off x="304800" y="1200150"/>
-            <a:ext cx="4267200" cy="3200400"/>
+            <a:off x="5715000" y="1466850"/>
+            <a:ext cx="1905000" cy="800100"/>
           </a:xfrm>
           <a:prstGeom prst="rect">
             <a:avLst/>
@@ -45075,7 +44764,7 @@
       </p:pic>
       <p:pic>
         <p:nvPicPr>
-          <p:cNvPr id="6" name="Picture 5"/>
+          <p:cNvPr id="7" name="Picture 6"/>
           <p:cNvPicPr>
             <a:picLocks noChangeAspect="1"/>
           </p:cNvPicPr>
@@ -45089,18 +44778,175 @@
         </p:blipFill>
         <p:spPr>
           <a:xfrm>
-            <a:off x="4495800" y="1200150"/>
-            <a:ext cx="4193672" cy="3321050"/>
+            <a:off x="5867400" y="2495550"/>
+            <a:ext cx="1714500" cy="381000"/>
           </a:xfrm>
           <a:prstGeom prst="rect">
             <a:avLst/>
           </a:prstGeom>
         </p:spPr>
       </p:pic>
+      <p:pic>
+        <p:nvPicPr>
+          <p:cNvPr id="8" name="Picture 7"/>
+          <p:cNvPicPr>
+            <a:picLocks noChangeAspect="1"/>
+          </p:cNvPicPr>
+          <p:nvPr/>
+        </p:nvPicPr>
+        <p:blipFill>
+          <a:blip r:embed="rId4"/>
+          <a:stretch>
+            <a:fillRect/>
+          </a:stretch>
+        </p:blipFill>
+        <p:spPr>
+          <a:xfrm>
+            <a:off x="5486400" y="3194050"/>
+            <a:ext cx="2806700" cy="673100"/>
+          </a:xfrm>
+          <a:prstGeom prst="rect">
+            <a:avLst/>
+          </a:prstGeom>
+        </p:spPr>
+      </p:pic>
+      <p:pic>
+        <p:nvPicPr>
+          <p:cNvPr id="9" name="Picture 8"/>
+          <p:cNvPicPr>
+            <a:picLocks noChangeAspect="1"/>
+          </p:cNvPicPr>
+          <p:nvPr/>
+        </p:nvPicPr>
+        <p:blipFill>
+          <a:blip r:embed="rId5"/>
+          <a:stretch>
+            <a:fillRect/>
+          </a:stretch>
+        </p:blipFill>
+        <p:spPr>
+          <a:xfrm>
+            <a:off x="4876800" y="4095750"/>
+            <a:ext cx="4191000" cy="990600"/>
+          </a:xfrm>
+          <a:prstGeom prst="rect">
+            <a:avLst/>
+          </a:prstGeom>
+        </p:spPr>
+      </p:pic>
+      <p:pic>
+        <p:nvPicPr>
+          <p:cNvPr id="10" name="Picture 9"/>
+          <p:cNvPicPr>
+            <a:picLocks noChangeAspect="1"/>
+          </p:cNvPicPr>
+          <p:nvPr/>
+        </p:nvPicPr>
+        <p:blipFill>
+          <a:blip r:embed="rId6"/>
+          <a:stretch>
+            <a:fillRect/>
+          </a:stretch>
+        </p:blipFill>
+        <p:spPr>
+          <a:xfrm>
+            <a:off x="5638800" y="819150"/>
+            <a:ext cx="2209800" cy="450980"/>
+          </a:xfrm>
+          <a:prstGeom prst="rect">
+            <a:avLst/>
+          </a:prstGeom>
+        </p:spPr>
+      </p:pic>
+      <p:sp>
+        <p:nvSpPr>
+          <p:cNvPr id="5" name="TextBox 4"/>
+          <p:cNvSpPr txBox="1"/>
+          <p:nvPr/>
+        </p:nvSpPr>
+        <p:spPr>
+          <a:xfrm>
+            <a:off x="0" y="666750"/>
+            <a:ext cx="5181600" cy="4708981"/>
+          </a:xfrm>
+          <a:prstGeom prst="rect">
+            <a:avLst/>
+          </a:prstGeom>
+          <a:noFill/>
+        </p:spPr>
+        <p:txBody>
+          <a:bodyPr wrap="square" rtlCol="0">
+            <a:spAutoFit/>
+          </a:bodyPr>
+          <a:lstStyle/>
+          <a:p>
+            <a:r>
+              <a:rPr lang="en-US" sz="2000" dirty="0"/>
+              <a:t>Linear regression with residual term. Represents what we can’t explain with our model.</a:t>
+            </a:r>
+          </a:p>
+          <a:p>
+            <a:endParaRPr lang="en-US" sz="2000" dirty="0"/>
+          </a:p>
+          <a:p>
+            <a:r>
+              <a:rPr lang="en-US" sz="2000" dirty="0"/>
+              <a:t>RSS measures the amount of variability that is left unexplained after performing the regression</a:t>
+            </a:r>
+          </a:p>
+          <a:p>
+            <a:endParaRPr lang="en-US" sz="2000" baseline="30000" dirty="0"/>
+          </a:p>
+          <a:p>
+            <a:r>
+              <a:rPr lang="en-US" sz="2000" dirty="0"/>
+              <a:t>TSS (Total sum of squares) measures the total variance when measuring the response y.</a:t>
+            </a:r>
+          </a:p>
+          <a:p>
+            <a:endParaRPr lang="en-US" sz="2000" dirty="0"/>
+          </a:p>
+          <a:p>
+            <a:r>
+              <a:rPr lang="en-US" sz="2000" dirty="0"/>
+              <a:t>R</a:t>
+            </a:r>
+            <a:r>
+              <a:rPr lang="en-US" sz="2000" baseline="30000" dirty="0"/>
+              <a:t>2</a:t>
+            </a:r>
+            <a:r>
+              <a:rPr lang="en-US" sz="2000" dirty="0"/>
+              <a:t>  amount of variance explained by our model</a:t>
+            </a:r>
+            <a:endParaRPr lang="en-US" sz="2000" baseline="30000" dirty="0"/>
+          </a:p>
+          <a:p>
+            <a:endParaRPr lang="en-US" sz="2000" baseline="30000" dirty="0"/>
+          </a:p>
+          <a:p>
+            <a:r>
+              <a:rPr lang="en-US" sz="2000" dirty="0"/>
+              <a:t>The RSE is an estimate of the standard deviation of </a:t>
+            </a:r>
+            <a:r>
+              <a:rPr lang="en-US" sz="2000" dirty="0" err="1"/>
+              <a:t>ε</a:t>
+            </a:r>
+            <a:r>
+              <a:rPr lang="en-US" sz="2000" dirty="0"/>
+              <a:t>. It is basically the average amount that the response will deviate from the true regression line. </a:t>
+            </a:r>
+          </a:p>
+          <a:p>
+            <a:endParaRPr lang="en-US" sz="2000" baseline="30000" dirty="0"/>
+          </a:p>
+        </p:txBody>
+      </p:sp>
     </p:spTree>
     <p:extLst>
       <p:ext uri="{BB962C8B-B14F-4D97-AF65-F5344CB8AC3E}">
-        <p14:creationId xmlns:p14="http://schemas.microsoft.com/office/powerpoint/2010/main" val="2988132113"/>
+        <p14:creationId xmlns:p14="http://schemas.microsoft.com/office/powerpoint/2010/main" val="1620471663"/>
       </p:ext>
     </p:extLst>
   </p:cSld>
@@ -45129,6 +44975,339 @@
       </p:grpSpPr>
       <p:sp>
         <p:nvSpPr>
+          <p:cNvPr id="2" name="TextBox 1"/>
+          <p:cNvSpPr txBox="1"/>
+          <p:nvPr/>
+        </p:nvSpPr>
+        <p:spPr>
+          <a:xfrm>
+            <a:off x="762000" y="133350"/>
+            <a:ext cx="3949919" cy="584776"/>
+          </a:xfrm>
+          <a:prstGeom prst="rect">
+            <a:avLst/>
+          </a:prstGeom>
+          <a:noFill/>
+        </p:spPr>
+        <p:txBody>
+          <a:bodyPr wrap="none" rtlCol="0">
+            <a:spAutoFit/>
+          </a:bodyPr>
+          <a:lstStyle/>
+          <a:p>
+            <a:r>
+              <a:rPr lang="en-US" sz="3200" dirty="0"/>
+              <a:t>Least square approach</a:t>
+            </a:r>
+          </a:p>
+        </p:txBody>
+      </p:sp>
+      <p:sp>
+        <p:nvSpPr>
+          <p:cNvPr id="5" name="TextBox 4"/>
+          <p:cNvSpPr txBox="1"/>
+          <p:nvPr/>
+        </p:nvSpPr>
+        <p:spPr>
+          <a:xfrm>
+            <a:off x="304800" y="3486150"/>
+            <a:ext cx="5334000" cy="1015663"/>
+          </a:xfrm>
+          <a:prstGeom prst="rect">
+            <a:avLst/>
+          </a:prstGeom>
+          <a:noFill/>
+        </p:spPr>
+        <p:txBody>
+          <a:bodyPr wrap="square" rtlCol="0">
+            <a:spAutoFit/>
+          </a:bodyPr>
+          <a:lstStyle/>
+          <a:p>
+            <a:r>
+              <a:rPr lang="en-US" sz="2000" dirty="0"/>
+              <a:t>The least squares approach chooses β</a:t>
+            </a:r>
+            <a:r>
+              <a:rPr lang="en-US" sz="2000" baseline="-25000" dirty="0"/>
+              <a:t>0</a:t>
+            </a:r>
+            <a:r>
+              <a:rPr lang="en-US" sz="2000" dirty="0"/>
+              <a:t> and β</a:t>
+            </a:r>
+            <a:r>
+              <a:rPr lang="en-US" sz="2000" baseline="-25000" dirty="0"/>
+              <a:t>1</a:t>
+            </a:r>
+            <a:r>
+              <a:rPr lang="en-US" sz="2000" dirty="0"/>
+              <a:t> to minimize the RSS. Using some calculus, one can show that the minimizers are:</a:t>
+            </a:r>
+            <a:endParaRPr lang="en-US" sz="2000" baseline="30000" dirty="0"/>
+          </a:p>
+        </p:txBody>
+      </p:sp>
+      <p:pic>
+        <p:nvPicPr>
+          <p:cNvPr id="6" name="Picture 5"/>
+          <p:cNvPicPr>
+            <a:picLocks noChangeAspect="1"/>
+          </p:cNvPicPr>
+          <p:nvPr/>
+        </p:nvPicPr>
+        <p:blipFill>
+          <a:blip r:embed="rId2"/>
+          <a:stretch>
+            <a:fillRect/>
+          </a:stretch>
+        </p:blipFill>
+        <p:spPr>
+          <a:xfrm>
+            <a:off x="3505200" y="1504950"/>
+            <a:ext cx="1905000" cy="800100"/>
+          </a:xfrm>
+          <a:prstGeom prst="rect">
+            <a:avLst/>
+          </a:prstGeom>
+        </p:spPr>
+      </p:pic>
+      <p:pic>
+        <p:nvPicPr>
+          <p:cNvPr id="10" name="Picture 9"/>
+          <p:cNvPicPr>
+            <a:picLocks noChangeAspect="1"/>
+          </p:cNvPicPr>
+          <p:nvPr/>
+        </p:nvPicPr>
+        <p:blipFill>
+          <a:blip r:embed="rId3"/>
+          <a:stretch>
+            <a:fillRect/>
+          </a:stretch>
+        </p:blipFill>
+        <p:spPr>
+          <a:xfrm>
+            <a:off x="3505200" y="819150"/>
+            <a:ext cx="2209800" cy="450980"/>
+          </a:xfrm>
+          <a:prstGeom prst="rect">
+            <a:avLst/>
+          </a:prstGeom>
+        </p:spPr>
+      </p:pic>
+      <p:pic>
+        <p:nvPicPr>
+          <p:cNvPr id="3" name="Picture 2"/>
+          <p:cNvPicPr>
+            <a:picLocks noChangeAspect="1"/>
+          </p:cNvPicPr>
+          <p:nvPr/>
+        </p:nvPicPr>
+        <p:blipFill>
+          <a:blip r:embed="rId4"/>
+          <a:stretch>
+            <a:fillRect/>
+          </a:stretch>
+        </p:blipFill>
+        <p:spPr>
+          <a:xfrm>
+            <a:off x="5486400" y="3406241"/>
+            <a:ext cx="3534780" cy="1235609"/>
+          </a:xfrm>
+          <a:prstGeom prst="rect">
+            <a:avLst/>
+          </a:prstGeom>
+        </p:spPr>
+      </p:pic>
+      <p:pic>
+        <p:nvPicPr>
+          <p:cNvPr id="4" name="Picture 3"/>
+          <p:cNvPicPr>
+            <a:picLocks noChangeAspect="1"/>
+          </p:cNvPicPr>
+          <p:nvPr/>
+        </p:nvPicPr>
+        <p:blipFill>
+          <a:blip r:embed="rId5"/>
+          <a:stretch>
+            <a:fillRect/>
+          </a:stretch>
+        </p:blipFill>
+        <p:spPr>
+          <a:xfrm>
+            <a:off x="762000" y="2343150"/>
+            <a:ext cx="7683166" cy="615950"/>
+          </a:xfrm>
+          <a:prstGeom prst="rect">
+            <a:avLst/>
+          </a:prstGeom>
+        </p:spPr>
+      </p:pic>
+      <p:pic>
+        <p:nvPicPr>
+          <p:cNvPr id="11" name="Picture 10"/>
+          <p:cNvPicPr>
+            <a:picLocks noChangeAspect="1"/>
+          </p:cNvPicPr>
+          <p:nvPr/>
+        </p:nvPicPr>
+        <p:blipFill>
+          <a:blip r:embed="rId6"/>
+          <a:stretch>
+            <a:fillRect/>
+          </a:stretch>
+        </p:blipFill>
+        <p:spPr>
+          <a:xfrm>
+            <a:off x="6400800" y="57150"/>
+            <a:ext cx="2463800" cy="2348962"/>
+          </a:xfrm>
+          <a:prstGeom prst="rect">
+            <a:avLst/>
+          </a:prstGeom>
+        </p:spPr>
+      </p:pic>
+    </p:spTree>
+    <p:extLst>
+      <p:ext uri="{BB962C8B-B14F-4D97-AF65-F5344CB8AC3E}">
+        <p14:creationId xmlns:p14="http://schemas.microsoft.com/office/powerpoint/2010/main" val="1297300796"/>
+      </p:ext>
+    </p:extLst>
+  </p:cSld>
+  <p:clrMapOvr>
+    <a:masterClrMapping/>
+  </p:clrMapOvr>
+</p:sld>
+</file>
+
+<file path=ppt/slides/slide52.xml><?xml version="1.0" encoding="utf-8"?>
+<p:sld xmlns:a="http://schemas.openxmlformats.org/drawingml/2006/main" xmlns:r="http://schemas.openxmlformats.org/officeDocument/2006/relationships" xmlns:p="http://schemas.openxmlformats.org/presentationml/2006/main">
+  <p:cSld>
+    <p:spTree>
+      <p:nvGrpSpPr>
+        <p:cNvPr id="1" name=""/>
+        <p:cNvGrpSpPr/>
+        <p:nvPr/>
+      </p:nvGrpSpPr>
+      <p:grpSpPr>
+        <a:xfrm>
+          <a:off x="0" y="0"/>
+          <a:ext cx="0" cy="0"/>
+          <a:chOff x="0" y="0"/>
+          <a:chExt cx="0" cy="0"/>
+        </a:xfrm>
+      </p:grpSpPr>
+      <p:sp>
+        <p:nvSpPr>
+          <p:cNvPr id="2" name="TextBox 1"/>
+          <p:cNvSpPr txBox="1"/>
+          <p:nvPr/>
+        </p:nvSpPr>
+        <p:spPr>
+          <a:xfrm>
+            <a:off x="457200" y="514350"/>
+            <a:ext cx="6762750" cy="338554"/>
+          </a:xfrm>
+          <a:prstGeom prst="rect">
+            <a:avLst/>
+          </a:prstGeom>
+          <a:noFill/>
+        </p:spPr>
+        <p:txBody>
+          <a:bodyPr wrap="square" rtlCol="0">
+            <a:spAutoFit/>
+          </a:bodyPr>
+          <a:lstStyle/>
+          <a:p>
+            <a:r>
+              <a:rPr lang="en-US" sz="2400" baseline="30000" dirty="0"/>
+              <a:t>Saving and plotting theta</a:t>
+            </a:r>
+            <a:endParaRPr lang="en-US" sz="2400" dirty="0"/>
+          </a:p>
+        </p:txBody>
+      </p:sp>
+      <p:pic>
+        <p:nvPicPr>
+          <p:cNvPr id="4" name="Picture 3"/>
+          <p:cNvPicPr>
+            <a:picLocks noChangeAspect="1"/>
+          </p:cNvPicPr>
+          <p:nvPr/>
+        </p:nvPicPr>
+        <p:blipFill>
+          <a:blip r:embed="rId2"/>
+          <a:stretch>
+            <a:fillRect/>
+          </a:stretch>
+        </p:blipFill>
+        <p:spPr>
+          <a:xfrm>
+            <a:off x="304800" y="1200150"/>
+            <a:ext cx="4267200" cy="3200400"/>
+          </a:xfrm>
+          <a:prstGeom prst="rect">
+            <a:avLst/>
+          </a:prstGeom>
+        </p:spPr>
+      </p:pic>
+      <p:pic>
+        <p:nvPicPr>
+          <p:cNvPr id="6" name="Picture 5"/>
+          <p:cNvPicPr>
+            <a:picLocks noChangeAspect="1"/>
+          </p:cNvPicPr>
+          <p:nvPr/>
+        </p:nvPicPr>
+        <p:blipFill>
+          <a:blip r:embed="rId3"/>
+          <a:stretch>
+            <a:fillRect/>
+          </a:stretch>
+        </p:blipFill>
+        <p:spPr>
+          <a:xfrm>
+            <a:off x="4495800" y="1200150"/>
+            <a:ext cx="4193672" cy="3321050"/>
+          </a:xfrm>
+          <a:prstGeom prst="rect">
+            <a:avLst/>
+          </a:prstGeom>
+        </p:spPr>
+      </p:pic>
+    </p:spTree>
+    <p:extLst>
+      <p:ext uri="{BB962C8B-B14F-4D97-AF65-F5344CB8AC3E}">
+        <p14:creationId xmlns:p14="http://schemas.microsoft.com/office/powerpoint/2010/main" val="2988132113"/>
+      </p:ext>
+    </p:extLst>
+  </p:cSld>
+  <p:clrMapOvr>
+    <a:masterClrMapping/>
+  </p:clrMapOvr>
+</p:sld>
+</file>
+
+<file path=ppt/slides/slide53.xml><?xml version="1.0" encoding="utf-8"?>
+<p:sld xmlns:a="http://schemas.openxmlformats.org/drawingml/2006/main" xmlns:r="http://schemas.openxmlformats.org/officeDocument/2006/relationships" xmlns:p="http://schemas.openxmlformats.org/presentationml/2006/main">
+  <p:cSld>
+    <p:spTree>
+      <p:nvGrpSpPr>
+        <p:cNvPr id="1" name=""/>
+        <p:cNvGrpSpPr/>
+        <p:nvPr/>
+      </p:nvGrpSpPr>
+      <p:grpSpPr>
+        <a:xfrm>
+          <a:off x="0" y="0"/>
+          <a:ext cx="0" cy="0"/>
+          <a:chOff x="0" y="0"/>
+          <a:chExt cx="0" cy="0"/>
+        </a:xfrm>
+      </p:grpSpPr>
+      <p:sp>
+        <p:nvSpPr>
           <p:cNvPr id="2" name="Rectangle 1"/>
           <p:cNvSpPr/>
           <p:nvPr/>
@@ -45241,7 +45420,7 @@
 </p:sld>
 </file>
 
-<file path=ppt/slides/slide52.xml><?xml version="1.0" encoding="utf-8"?>
+<file path=ppt/slides/slide54.xml><?xml version="1.0" encoding="utf-8"?>
 <p:sld xmlns:a="http://schemas.openxmlformats.org/drawingml/2006/main" xmlns:r="http://schemas.openxmlformats.org/officeDocument/2006/relationships" xmlns:p="http://schemas.openxmlformats.org/presentationml/2006/main">
   <p:cSld>
     <p:spTree>

</xml_diff>